<commit_message>
finished 3rd lesson of NetworkProgramming
</commit_message>
<xml_diff>
--- a/slides/Ders02.pptx
+++ b/slides/Ders02.pptx
@@ -132,6 +132,706 @@
 </p:presentation>
 </file>
 
+<file path=ppt/ink/ink1.xml><?xml version="1.0" encoding="utf-8"?>
+<inkml:ink xmlns:inkml="http://www.w3.org/2003/InkML">
+  <inkml:definitions>
+    <inkml:context xml:id="ctx0">
+      <inkml:inkSource xml:id="inkSrc0">
+        <inkml:traceFormat>
+          <inkml:channel name="X" type="integer" min="-2.14748E9" max="2.14748E9" units="cm"/>
+          <inkml:channel name="Y" type="integer" min="-2.14748E9" max="2.14748E9" units="cm"/>
+          <inkml:channel name="F" type="integer" max="32767" units="dev"/>
+        </inkml:traceFormat>
+        <inkml:channelProperties>
+          <inkml:channelProperty channel="X" name="resolution" value="1000" units="1/cm"/>
+          <inkml:channelProperty channel="Y" name="resolution" value="1000" units="1/cm"/>
+          <inkml:channelProperty channel="F" name="resolution" value="0" units="1/dev"/>
+        </inkml:channelProperties>
+      </inkml:inkSource>
+      <inkml:timestamp xml:id="ts0" timeString="2022-03-06T12:24:53.794"/>
+    </inkml:context>
+    <inkml:brush xml:id="br0">
+      <inkml:brushProperty name="width" value="0.05" units="cm"/>
+      <inkml:brushProperty name="height" value="0.05" units="cm"/>
+      <inkml:brushProperty name="color" value="#E71224"/>
+    </inkml:brush>
+  </inkml:definitions>
+  <inkml:trace contextRef="#ctx0" brushRef="#br0">14 0 24575,'0'8'0,"-3"5"0,-2 6 0,0 1 0,5-1 0,10-4 0,17-5 0,13-4 0,10-3 0,0-2 0,0-2 0,-2 1 0,-5-1 0,-10 0-8191</inkml:trace>
+</inkml:ink>
+</file>
+
+<file path=ppt/ink/ink10.xml><?xml version="1.0" encoding="utf-8"?>
+<inkml:ink xmlns:inkml="http://www.w3.org/2003/InkML">
+  <inkml:definitions>
+    <inkml:context xml:id="ctx0">
+      <inkml:inkSource xml:id="inkSrc0">
+        <inkml:traceFormat>
+          <inkml:channel name="X" type="integer" min="-2.14748E9" max="2.14748E9" units="cm"/>
+          <inkml:channel name="Y" type="integer" min="-2.14748E9" max="2.14748E9" units="cm"/>
+          <inkml:channel name="F" type="integer" max="32767" units="dev"/>
+        </inkml:traceFormat>
+        <inkml:channelProperties>
+          <inkml:channelProperty channel="X" name="resolution" value="1000" units="1/cm"/>
+          <inkml:channelProperty channel="Y" name="resolution" value="1000" units="1/cm"/>
+          <inkml:channelProperty channel="F" name="resolution" value="0" units="1/dev"/>
+        </inkml:channelProperties>
+      </inkml:inkSource>
+      <inkml:timestamp xml:id="ts0" timeString="2022-03-06T12:25:05.113"/>
+    </inkml:context>
+    <inkml:brush xml:id="br0">
+      <inkml:brushProperty name="width" value="0.05" units="cm"/>
+      <inkml:brushProperty name="height" value="0.05" units="cm"/>
+      <inkml:brushProperty name="color" value="#E71224"/>
+    </inkml:brush>
+  </inkml:definitions>
+  <inkml:trace contextRef="#ctx0" brushRef="#br0">0 0 24575,'11'0'0,"12"0"0,5 0 0,5 0 0,1 0 0,-2 0 0,-2 0 0,-3 0 0,-2 0 0,-2 0 0,0 0 0,-2 0 0,1 0 0,-4 0-8191</inkml:trace>
+</inkml:ink>
+</file>
+
+<file path=ppt/ink/ink11.xml><?xml version="1.0" encoding="utf-8"?>
+<inkml:ink xmlns:inkml="http://www.w3.org/2003/InkML">
+  <inkml:definitions>
+    <inkml:context xml:id="ctx0">
+      <inkml:inkSource xml:id="inkSrc0">
+        <inkml:traceFormat>
+          <inkml:channel name="X" type="integer" min="-2.14748E9" max="2.14748E9" units="cm"/>
+          <inkml:channel name="Y" type="integer" min="-2.14748E9" max="2.14748E9" units="cm"/>
+          <inkml:channel name="F" type="integer" max="32767" units="dev"/>
+        </inkml:traceFormat>
+        <inkml:channelProperties>
+          <inkml:channelProperty channel="X" name="resolution" value="1000" units="1/cm"/>
+          <inkml:channelProperty channel="Y" name="resolution" value="1000" units="1/cm"/>
+          <inkml:channelProperty channel="F" name="resolution" value="0" units="1/dev"/>
+        </inkml:channelProperties>
+      </inkml:inkSource>
+      <inkml:timestamp xml:id="ts0" timeString="2022-03-06T12:25:07.605"/>
+    </inkml:context>
+    <inkml:brush xml:id="br0">
+      <inkml:brushProperty name="width" value="0.05" units="cm"/>
+      <inkml:brushProperty name="height" value="0.05" units="cm"/>
+      <inkml:brushProperty name="color" value="#E71224"/>
+    </inkml:brush>
+  </inkml:definitions>
+  <inkml:trace contextRef="#ctx0" brushRef="#br0">180 5 24575,'-7'-1'0,"1"1"0,-1 1 0,1-1 0,-1 1 0,1 0 0,-1 1 0,1-1 0,0 1 0,0 1 0,0-1 0,0 1 0,-11 6 0,14-5 0,-1-1 0,1 1 0,-1 0 0,1 0 0,0 0 0,0 0 0,1 0 0,-1 1 0,1-1 0,0 1 0,0-1 0,1 1 0,-1 0 0,1 0 0,0 0 0,0 0 0,0 7 0,1-9 0,-2 13 0,1-1 0,1 1 0,0-1 0,4 26 0,-4-37 0,1-1 0,0 1 0,-1-1 0,2 0 0,-1 0 0,0 0 0,1 0 0,-1 1 0,1-2 0,0 1 0,0 0 0,0 0 0,0-1 0,1 1 0,-1-1 0,1 1 0,-1-1 0,1 0 0,0 0 0,0-1 0,0 1 0,0 0 0,0-1 0,0 0 0,0 0 0,1 0 0,4 1 0,-2 0 0,1-1 0,-1 0 0,0-1 0,1 1 0,-1-1 0,1-1 0,-1 1 0,1-1 0,-1 0 0,1-1 0,-1 1 0,0-1 0,0 0 0,0-1 0,0 0 0,0 1 0,10-8 0,-7 1 0,1 0 0,-2 0 0,1-1 0,-1 0 0,-1 0 0,0-1 0,0 0 0,6-14 0,-10 20 0,0-1 0,-1 1 0,0 0 0,0-1 0,0 1 0,-1-1 0,1 1 0,-1-1 0,-1 0 0,1 1 0,-1-11 0,-1 13 0,0 0 0,1 0 0,-1 0 0,0 0 0,-1 0 0,1 0 0,-1 1 0,1-1 0,-1 0 0,0 1 0,0-1 0,0 1 0,0-1 0,0 1 0,-1 0 0,1 0 0,-1 0 0,1 0 0,-1 0 0,0 1 0,-4-3 0,-6-1 0,-1 0 0,1 0 0,-1 1 0,1 1 0,-1 0 0,0 1 0,-1 0 0,1 1 0,0 1 0,0 0 0,0 1 0,0 1 0,0 0 0,0 1 0,-19 6 0,30-8 6,0 0-1,1 1 1,-1-1-1,1 1 0,0-1 1,-1 1-1,1 0 1,0 0-1,0 0 1,0 0-1,0 0 1,0 0-1,1 1 0,-1-1 1,1 0-1,0 1 1,-1 0-1,1-1 1,0 1-1,0 0 1,0 2-1,0 2-170,-1-1 0,2 0 0,-1 1 0,1-1 0,0 1 0,0-1 0,1 1 0,1 7 0,3 7-6661</inkml:trace>
+</inkml:ink>
+</file>
+
+<file path=ppt/ink/ink12.xml><?xml version="1.0" encoding="utf-8"?>
+<inkml:ink xmlns:inkml="http://www.w3.org/2003/InkML">
+  <inkml:definitions>
+    <inkml:context xml:id="ctx0">
+      <inkml:inkSource xml:id="inkSrc0">
+        <inkml:traceFormat>
+          <inkml:channel name="X" type="integer" min="-2.14748E9" max="2.14748E9" units="cm"/>
+          <inkml:channel name="Y" type="integer" min="-2.14748E9" max="2.14748E9" units="cm"/>
+          <inkml:channel name="F" type="integer" max="32767" units="dev"/>
+        </inkml:traceFormat>
+        <inkml:channelProperties>
+          <inkml:channelProperty channel="X" name="resolution" value="1000" units="1/cm"/>
+          <inkml:channelProperty channel="Y" name="resolution" value="1000" units="1/cm"/>
+          <inkml:channelProperty channel="F" name="resolution" value="0" units="1/dev"/>
+        </inkml:channelProperties>
+      </inkml:inkSource>
+      <inkml:timestamp xml:id="ts0" timeString="2022-03-06T12:25:08.719"/>
+    </inkml:context>
+    <inkml:brush xml:id="br0">
+      <inkml:brushProperty name="width" value="0.05" units="cm"/>
+      <inkml:brushProperty name="height" value="0.05" units="cm"/>
+      <inkml:brushProperty name="color" value="#E71224"/>
+    </inkml:brush>
+  </inkml:definitions>
+  <inkml:trace contextRef="#ctx0" brushRef="#br0">57 160 24575,'15'263'0,"-7"-171"0,-7-59 0,-1-33 0,0 0 0,0-1 0,0 1 0,0 0 0,0 0 0,0 0 0,0 0 0,0 0 0,0 0 0,0 0 0,0 0 0,0 0 0,0 0 0,-1 0 0,1 0 0,0 0 0,0 0 0,0 0 0,0-1 0,0 1 0,0 0 0,0 0 0,0 0 0,0 0 0,-1 0 0,1 0 0,0 0 0,0 0 0,0 0 0,0 0 0,0 0 0,0 0 0,0 1 0,-1-1 0,-11-54 0,4 17 0,-4-6 0,1-1 0,2 0 0,2-1 0,2 0 0,2 0 0,3-55 0,1 96 0,1-1 0,-1 1 0,1 0 0,0-1 0,0 1 0,0 0 0,0 0 0,1 0 0,0 1 0,-1-1 0,1 1 0,1-1 0,-1 1 0,0 0 0,1 0 0,0 0 0,-1 1 0,1-1 0,0 1 0,1 0 0,-1 0 0,0 1 0,0-1 0,1 1 0,5-1 0,-3 0 0,0 0 0,0 0 0,0 1 0,0 1 0,0-1 0,0 1 0,0 0 0,0 0 0,0 1 0,0 0 0,0 0 0,0 1 0,0 0 0,0 0 0,12 7 0,-15-6 0,1 1 0,-1-1 0,0 1 0,0 0 0,-1 1 0,1-1 0,-1 1 0,0 0 0,0-1 0,0 1 0,-1 1 0,0-1 0,0 0 0,0 0 0,0 1 0,0 6 0,-1-9 0,-1 0 0,1 0 0,-1 0 0,0 0 0,0 0 0,0 0 0,0 1 0,-1-1 0,1 0 0,-1 0 0,0 0 0,0 0 0,0 0 0,0 0 0,0-1 0,-1 1 0,1 0 0,-1 0 0,0-1 0,1 1 0,-1-1 0,-1 0 0,1 1 0,0-1 0,0 0 0,-1 0 0,1-1 0,-1 1 0,-5 2 0,-11 2-96,-1-1 0,1-1 0,-1 0 0,0-2 0,0-1 0,0 0 0,-30-3 0,34 2-501,-12-1-6229</inkml:trace>
+</inkml:ink>
+</file>
+
+<file path=ppt/ink/ink13.xml><?xml version="1.0" encoding="utf-8"?>
+<inkml:ink xmlns:inkml="http://www.w3.org/2003/InkML">
+  <inkml:definitions>
+    <inkml:context xml:id="ctx0">
+      <inkml:inkSource xml:id="inkSrc0">
+        <inkml:traceFormat>
+          <inkml:channel name="X" type="integer" min="-2.14748E9" max="2.14748E9" units="cm"/>
+          <inkml:channel name="Y" type="integer" min="-2.14748E9" max="2.14748E9" units="cm"/>
+          <inkml:channel name="F" type="integer" max="32767" units="dev"/>
+        </inkml:traceFormat>
+        <inkml:channelProperties>
+          <inkml:channelProperty channel="X" name="resolution" value="1000" units="1/cm"/>
+          <inkml:channelProperty channel="Y" name="resolution" value="1000" units="1/cm"/>
+          <inkml:channelProperty channel="F" name="resolution" value="0" units="1/dev"/>
+        </inkml:channelProperties>
+      </inkml:inkSource>
+      <inkml:timestamp xml:id="ts0" timeString="2022-03-06T12:25:10.378"/>
+    </inkml:context>
+    <inkml:brush xml:id="br0">
+      <inkml:brushProperty name="width" value="0.05" units="cm"/>
+      <inkml:brushProperty name="height" value="0.05" units="cm"/>
+      <inkml:brushProperty name="color" value="#E71224"/>
+    </inkml:brush>
+  </inkml:definitions>
+  <inkml:trace contextRef="#ctx0" brushRef="#br0">0 229 24575,'27'0'0,"-7"1"0,0-1 0,0-1 0,1-1 0,37-8 0,-54 9 0,0 0 0,0 0 0,0-1 0,0 0 0,0 1 0,-1-2 0,1 1 0,-1 0 0,1-1 0,-1 1 0,0-1 0,1 0 0,-1 0 0,-1 0 0,1-1 0,0 1 0,-1-1 0,0 1 0,0-1 0,0 0 0,0 0 0,-1 0 0,1 0 0,-1 0 0,0 0 0,0 0 0,-1 0 0,1-1 0,-1-4 0,0 7 0,0 0 0,0 0 0,0 0 0,0 0 0,0 1 0,-1-1 0,1 0 0,-1 0 0,1 1 0,-1-1 0,0 0 0,0 1 0,1-1 0,-1 1 0,0-1 0,-1 1 0,1-1 0,0 1 0,0-1 0,-1 1 0,1 0 0,0 0 0,-3-2 0,0 1 0,0 1 0,0-1 0,0 1 0,0-1 0,0 1 0,0 0 0,0 1 0,0-1 0,0 1 0,-6 0 0,4 0 0,0 0 0,0 0 0,0 1 0,0 0 0,0 0 0,0 0 0,0 1 0,0 0 0,1 0 0,-1 1 0,1-1 0,-1 1 0,1 0 0,0 1 0,-5 4 0,2 4 0,1-1 0,0 1 0,1 1 0,0-1 0,1 1 0,0 0 0,1 0 0,1 0 0,0 1 0,1-1 0,0 1 0,1 0 0,1 0 0,0-1 0,1 1 0,0 0 0,5 18 0,-5-29 0,0 0 0,0 0 0,1-1 0,-1 1 0,1-1 0,0 1 0,0-1 0,0 0 0,0 0 0,0 0 0,0 0 0,1 0 0,-1 0 0,1 0 0,-1-1 0,1 1 0,-1-1 0,1 0 0,0 0 0,0 0 0,0 0 0,0 0 0,0-1 0,3 1 0,12 2 0,0-2 0,35 0 0,-34-1 0,-6 0 0,0 0 0,0-1 0,0-1 0,0 0 0,-1-1 0,1 0 0,-1-1 0,0 0 0,0-1 0,0-1 0,19-11 0,-23 11 0,1 0 0,-1-1 0,-1 0 0,1-1 0,-1 1 0,0-1 0,-1-1 0,0 1 0,0-1 0,-1 0 0,0-1 0,-1 1 0,0-1 0,4-15 0,-8 24 0,0 0 0,0 0 0,0 0 0,0 1 0,0-1 0,0 0 0,1 0 0,-1 0 0,0 0 0,0 1 0,1-1 0,-1 0 0,1 0 0,-1 1 0,0-1 0,1 0 0,-1 1 0,1-1 0,-1 0 0,1 1 0,0-1 0,-1 1 0,1-1 0,0 1 0,-1-1 0,1 1 0,0-1 0,0 1 0,-1 0 0,1-1 0,0 1 0,0 0 0,1 0 0,-1 0 0,1 2 0,-1-1 0,1 0 0,-1 0 0,0 0 0,0 1 0,1-1 0,-1 0 0,0 1 0,0-1 0,0 1 0,0 0 0,-1-1 0,2 3 0,22 64 0,-23-66 0,0 1 0,-1 0 0,0-1 0,1 1 0,0 0 0,0 0 0,-1-1 0,2 1 0,-1-1 0,0 1 0,0-1 0,1 1 0,0-1 0,-1 0 0,1 1 0,4 2 0,-6-5 0,0-1 0,1 1 0,-1-1 0,1 1 0,-1-1 0,0 1 0,1-1 0,-1 1 0,0-1 0,1 1 0,-1-1 0,0 1 0,0-1 0,0 0 0,0 1 0,1-1 0,-1 1 0,0-1 0,0 0 0,0 1 0,0-1 0,0 1 0,-1-1 0,1 0 0,0 1 0,0-1 0,0 1 0,0-1 0,-1 0 0,1 0 0,-7-24 0,6 23 0,1 0 0,-11-33 0,-10-59 0,19 86 0,1-1 0,0 1 0,1 0 0,-1-1 0,2 1 0,-1 0 0,1-1 0,1 1 0,-1 0 0,1 0 0,1 0 0,-1 0 0,7-13 0,-5 18 0,-1 0 0,0 0 0,0 0 0,1 0 0,0 1 0,-1 0 0,1 0 0,0 0 0,0 0 0,0 0 0,1 1 0,-1 0 0,0 0 0,0 0 0,1 0 0,-1 1 0,0-1 0,1 1 0,7 1 0,-3-1 0,0 0 0,0 1 0,1 1 0,-1-1 0,0 1 0,0 1 0,-1 0 0,14 5 0,-15-2-91,0 0 0,0 1 0,-1 0 0,1 0 0,-2 0 0,1 1 0,-1 0 0,0 0 0,-1 0 0,0 0 0,0 1 0,-1 0 0,0-1 0,2 11 0,3 8-6735</inkml:trace>
+</inkml:ink>
+</file>
+
+<file path=ppt/ink/ink14.xml><?xml version="1.0" encoding="utf-8"?>
+<inkml:ink xmlns:inkml="http://www.w3.org/2003/InkML">
+  <inkml:definitions>
+    <inkml:context xml:id="ctx0">
+      <inkml:inkSource xml:id="inkSrc0">
+        <inkml:traceFormat>
+          <inkml:channel name="X" type="integer" min="-2.14748E9" max="2.14748E9" units="cm"/>
+          <inkml:channel name="Y" type="integer" min="-2.14748E9" max="2.14748E9" units="cm"/>
+          <inkml:channel name="F" type="integer" max="32767" units="dev"/>
+        </inkml:traceFormat>
+        <inkml:channelProperties>
+          <inkml:channelProperty channel="X" name="resolution" value="1000" units="1/cm"/>
+          <inkml:channelProperty channel="Y" name="resolution" value="1000" units="1/cm"/>
+          <inkml:channelProperty channel="F" name="resolution" value="0" units="1/dev"/>
+        </inkml:channelProperties>
+      </inkml:inkSource>
+      <inkml:timestamp xml:id="ts0" timeString="2022-03-06T12:25:11.757"/>
+    </inkml:context>
+    <inkml:brush xml:id="br0">
+      <inkml:brushProperty name="width" value="0.05" units="cm"/>
+      <inkml:brushProperty name="height" value="0.05" units="cm"/>
+      <inkml:brushProperty name="color" value="#E71224"/>
+    </inkml:brush>
+  </inkml:definitions>
+  <inkml:trace contextRef="#ctx0" brushRef="#br0">313 21 24575,'-87'-10'0,"70"6"0,-1 2 0,1 0 0,0 0 0,-1 2 0,1 0 0,-26 3 0,40-2 0,-1 0 0,0 1 0,0-1 0,1 1 0,-1-1 0,0 1 0,1 0 0,0 0 0,-1 1 0,1-1 0,0 1 0,0 0 0,-4 4 0,4-2 0,0 0 0,0 0 0,1 0 0,-1 0 0,1 0 0,0 1 0,1-1 0,-1 1 0,1-1 0,0 1 0,1-1 0,-1 7 0,0 1 0,0 6 0,0-1 0,1 1 0,1 0 0,4 24 0,-4-38 0,0-1 0,0 0 0,0 0 0,1 0 0,-1 0 0,1 0 0,0 0 0,0 0 0,0 0 0,1-1 0,0 1 0,-1-1 0,1 0 0,0 0 0,1 0 0,-1 0 0,0 0 0,1-1 0,0 1 0,-1-1 0,1 0 0,0 0 0,0-1 0,5 3 0,-3-3 0,0 1 0,0-1 0,0 0 0,0 0 0,0-1 0,0 0 0,0 0 0,0 0 0,0 0 0,0-1 0,0 0 0,0-1 0,0 1 0,0-1 0,0 0 0,6-4 0,-8 4 0,-1-1 0,1 0 0,-1 1 0,1-1 0,-1-1 0,0 1 0,0 0 0,-1-1 0,1 1 0,-1-1 0,1 0 0,-1 0 0,0 0 0,-1 0 0,1 0 0,-1 0 0,0-1 0,0 1 0,0 0 0,0-1 0,-1 1 0,0-8 0,0 9 0,4-37 0,-4 39 0,0 1 0,0-1 0,0 1 0,0 0 0,0-1 0,1 1 0,-1-1 0,0 1 0,0 0 0,0-1 0,1 1 0,-1-1 0,0 1 0,0 0 0,1 0 0,-1-1 0,0 1 0,1 0 0,-1-1 0,0 1 0,1 0 0,-1 0 0,0-1 0,1 1 0,-1 0 0,0 0 0,1 0 0,0 0 0,14 14 0,11 35 0,-22-40 0,1 1 0,0-1 0,0 0 0,1-1 0,8 10 0,-11-15 0,1 0 0,0 1 0,0-2 0,0 1 0,0 0 0,0-1 0,0 0 0,1 0 0,-1 0 0,1 0 0,0-1 0,-1 0 0,1 0 0,9 1 0,-8-2 6,0 1 0,-1-1 1,1 0-1,0 0 0,-1-1 0,1 0 0,0 0 0,-1 0 0,0-1 0,1 0 0,9-4 0,-4-1-137,0 0 0,-1-1 0,17-16 0,-5 5-783,-5 4-5912</inkml:trace>
+</inkml:ink>
+</file>
+
+<file path=ppt/ink/ink15.xml><?xml version="1.0" encoding="utf-8"?>
+<inkml:ink xmlns:inkml="http://www.w3.org/2003/InkML">
+  <inkml:definitions>
+    <inkml:context xml:id="ctx0">
+      <inkml:inkSource xml:id="inkSrc0">
+        <inkml:traceFormat>
+          <inkml:channel name="X" type="integer" min="-2.14748E9" max="2.14748E9" units="cm"/>
+          <inkml:channel name="Y" type="integer" min="-2.14748E9" max="2.14748E9" units="cm"/>
+          <inkml:channel name="F" type="integer" max="32767" units="dev"/>
+        </inkml:traceFormat>
+        <inkml:channelProperties>
+          <inkml:channelProperty channel="X" name="resolution" value="1000" units="1/cm"/>
+          <inkml:channelProperty channel="Y" name="resolution" value="1000" units="1/cm"/>
+          <inkml:channelProperty channel="F" name="resolution" value="0" units="1/dev"/>
+        </inkml:channelProperties>
+      </inkml:inkSource>
+      <inkml:timestamp xml:id="ts0" timeString="2022-03-06T12:25:12.338"/>
+    </inkml:context>
+    <inkml:brush xml:id="br0">
+      <inkml:brushProperty name="width" value="0.05" units="cm"/>
+      <inkml:brushProperty name="height" value="0.05" units="cm"/>
+      <inkml:brushProperty name="color" value="#E71224"/>
+    </inkml:brush>
+  </inkml:definitions>
+  <inkml:trace contextRef="#ctx0" brushRef="#br0">215 0 24575,'26'29'0,"33"46"0,13 16 0,-65-83 0,0 0 0,0 1 0,-1 0 0,0 0 0,-1 0 0,0 1 0,0 0 0,-1 0 0,0 0 0,-1 0 0,0 1 0,-1-1 0,0 1 0,-1 0 0,0-1 0,-1 1 0,0 0 0,0 0 0,-1 0 0,-4 18 0,4-26 0,0 0 0,-1 0 0,1 0 0,-1 0 0,0 0 0,1 0 0,-1 0 0,-1 0 0,1-1 0,0 1 0,-1-1 0,1 1 0,-1-1 0,0 0 0,1 0 0,-1 0 0,0-1 0,0 1 0,-1-1 0,1 1 0,0-1 0,0 0 0,-1 0 0,1-1 0,-5 2 0,-12 1 0,-1-1 0,0 0 0,-22-2 0,19 0 0,-6 1-120,-7 1-295,0-2 0,-70-8 0,83 2-6411</inkml:trace>
+</inkml:ink>
+</file>
+
+<file path=ppt/ink/ink16.xml><?xml version="1.0" encoding="utf-8"?>
+<inkml:ink xmlns:inkml="http://www.w3.org/2003/InkML">
+  <inkml:definitions>
+    <inkml:context xml:id="ctx0">
+      <inkml:inkSource xml:id="inkSrc0">
+        <inkml:traceFormat>
+          <inkml:channel name="X" type="integer" min="-2.14748E9" max="2.14748E9" units="cm"/>
+          <inkml:channel name="Y" type="integer" min="-2.14748E9" max="2.14748E9" units="cm"/>
+          <inkml:channel name="F" type="integer" max="32767" units="dev"/>
+        </inkml:traceFormat>
+        <inkml:channelProperties>
+          <inkml:channelProperty channel="X" name="resolution" value="1000" units="1/cm"/>
+          <inkml:channelProperty channel="Y" name="resolution" value="1000" units="1/cm"/>
+          <inkml:channelProperty channel="F" name="resolution" value="0" units="1/dev"/>
+        </inkml:channelProperties>
+      </inkml:inkSource>
+      <inkml:timestamp xml:id="ts0" timeString="2022-03-06T12:25:13.242"/>
+    </inkml:context>
+    <inkml:brush xml:id="br0">
+      <inkml:brushProperty name="width" value="0.05" units="cm"/>
+      <inkml:brushProperty name="height" value="0.05" units="cm"/>
+      <inkml:brushProperty name="color" value="#E71224"/>
+    </inkml:brush>
+  </inkml:definitions>
+  <inkml:trace contextRef="#ctx0" brushRef="#br0">21 332 24575,'-10'-139'0,"5"93"0,0-56 0,5 101 0,0-1 0,0 0 0,0 0 0,0 1 0,1-1 0,-1 0 0,0 0 0,1 1 0,-1-1 0,1 1 0,0-1 0,0 0 0,0 1 0,-1-1 0,1 1 0,1 0 0,-1-1 0,0 1 0,0 0 0,0-1 0,1 1 0,-1 0 0,3-1 0,-1 1 0,0-1 0,0 1 0,0 0 0,0 1 0,1-1 0,-1 1 0,0-1 0,1 1 0,-1 0 0,0 0 0,6 1 0,6 2 0,0 0 0,0 1 0,0 0 0,17 9 0,23 15-1365,-37-14-5461</inkml:trace>
+</inkml:ink>
+</file>
+
+<file path=ppt/ink/ink17.xml><?xml version="1.0" encoding="utf-8"?>
+<inkml:ink xmlns:inkml="http://www.w3.org/2003/InkML">
+  <inkml:definitions>
+    <inkml:context xml:id="ctx0">
+      <inkml:inkSource xml:id="inkSrc0">
+        <inkml:traceFormat>
+          <inkml:channel name="X" type="integer" min="-2.14748E9" max="2.14748E9" units="cm"/>
+          <inkml:channel name="Y" type="integer" min="-2.14748E9" max="2.14748E9" units="cm"/>
+          <inkml:channel name="F" type="integer" max="32767" units="dev"/>
+        </inkml:traceFormat>
+        <inkml:channelProperties>
+          <inkml:channelProperty channel="X" name="resolution" value="1000" units="1/cm"/>
+          <inkml:channelProperty channel="Y" name="resolution" value="1000" units="1/cm"/>
+          <inkml:channelProperty channel="F" name="resolution" value="0" units="1/dev"/>
+        </inkml:channelProperties>
+      </inkml:inkSource>
+      <inkml:timestamp xml:id="ts0" timeString="2022-03-06T12:25:13.889"/>
+    </inkml:context>
+    <inkml:brush xml:id="br0">
+      <inkml:brushProperty name="width" value="0.05" units="cm"/>
+      <inkml:brushProperty name="height" value="0.05" units="cm"/>
+      <inkml:brushProperty name="color" value="#E71224"/>
+    </inkml:brush>
+  </inkml:definitions>
+  <inkml:trace contextRef="#ctx0" brushRef="#br0">1 0 24575,'3'0'0</inkml:trace>
+</inkml:ink>
+</file>
+
+<file path=ppt/ink/ink18.xml><?xml version="1.0" encoding="utf-8"?>
+<inkml:ink xmlns:inkml="http://www.w3.org/2003/InkML">
+  <inkml:definitions>
+    <inkml:context xml:id="ctx0">
+      <inkml:inkSource xml:id="inkSrc0">
+        <inkml:traceFormat>
+          <inkml:channel name="X" type="integer" min="-2.14748E9" max="2.14748E9" units="cm"/>
+          <inkml:channel name="Y" type="integer" min="-2.14748E9" max="2.14748E9" units="cm"/>
+          <inkml:channel name="F" type="integer" max="32767" units="dev"/>
+        </inkml:traceFormat>
+        <inkml:channelProperties>
+          <inkml:channelProperty channel="X" name="resolution" value="1000" units="1/cm"/>
+          <inkml:channelProperty channel="Y" name="resolution" value="1000" units="1/cm"/>
+          <inkml:channelProperty channel="F" name="resolution" value="0" units="1/dev"/>
+        </inkml:channelProperties>
+      </inkml:inkSource>
+      <inkml:timestamp xml:id="ts0" timeString="2022-03-06T12:25:15.096"/>
+    </inkml:context>
+    <inkml:brush xml:id="br0">
+      <inkml:brushProperty name="width" value="0.05" units="cm"/>
+      <inkml:brushProperty name="height" value="0.05" units="cm"/>
+      <inkml:brushProperty name="color" value="#E71224"/>
+    </inkml:brush>
+  </inkml:definitions>
+  <inkml:trace contextRef="#ctx0" brushRef="#br0">0 128 24575,'4'0'0,"9"-4"0,9-1 0,5 0 0,-2-2 0,-2-1 0,-1 2 0,-4-3 0,-2 1 0,1 2 0,1-2 0,4-4 0,-1-3 0,4 1 0,-7 3 0,-10 3 0,-14 7 0,-5 3-8191</inkml:trace>
+</inkml:ink>
+</file>
+
+<file path=ppt/ink/ink19.xml><?xml version="1.0" encoding="utf-8"?>
+<inkml:ink xmlns:inkml="http://www.w3.org/2003/InkML">
+  <inkml:definitions>
+    <inkml:context xml:id="ctx0">
+      <inkml:inkSource xml:id="inkSrc0">
+        <inkml:traceFormat>
+          <inkml:channel name="X" type="integer" min="-2.14748E9" max="2.14748E9" units="cm"/>
+          <inkml:channel name="Y" type="integer" min="-2.14748E9" max="2.14748E9" units="cm"/>
+          <inkml:channel name="F" type="integer" max="32767" units="dev"/>
+        </inkml:traceFormat>
+        <inkml:channelProperties>
+          <inkml:channelProperty channel="X" name="resolution" value="1000" units="1/cm"/>
+          <inkml:channelProperty channel="Y" name="resolution" value="1000" units="1/cm"/>
+          <inkml:channelProperty channel="F" name="resolution" value="0" units="1/dev"/>
+        </inkml:channelProperties>
+      </inkml:inkSource>
+      <inkml:timestamp xml:id="ts0" timeString="2022-03-06T12:25:16.234"/>
+    </inkml:context>
+    <inkml:brush xml:id="br0">
+      <inkml:brushProperty name="width" value="0.05" units="cm"/>
+      <inkml:brushProperty name="height" value="0.05" units="cm"/>
+      <inkml:brushProperty name="color" value="#E71224"/>
+    </inkml:brush>
+  </inkml:definitions>
+  <inkml:trace contextRef="#ctx0" brushRef="#br0">1 1 24575,'3'7'0,"3"7"0,2 8 0,5 4 0,3 5 0,2 1 0,3-1 0,-3-3 0,-4-1 0,-4-6-8191</inkml:trace>
+</inkml:ink>
+</file>
+
+<file path=ppt/ink/ink2.xml><?xml version="1.0" encoding="utf-8"?>
+<inkml:ink xmlns:inkml="http://www.w3.org/2003/InkML">
+  <inkml:definitions>
+    <inkml:context xml:id="ctx0">
+      <inkml:inkSource xml:id="inkSrc0">
+        <inkml:traceFormat>
+          <inkml:channel name="X" type="integer" min="-2.14748E9" max="2.14748E9" units="cm"/>
+          <inkml:channel name="Y" type="integer" min="-2.14748E9" max="2.14748E9" units="cm"/>
+          <inkml:channel name="F" type="integer" max="32767" units="dev"/>
+        </inkml:traceFormat>
+        <inkml:channelProperties>
+          <inkml:channelProperty channel="X" name="resolution" value="1000" units="1/cm"/>
+          <inkml:channelProperty channel="Y" name="resolution" value="1000" units="1/cm"/>
+          <inkml:channelProperty channel="F" name="resolution" value="0" units="1/dev"/>
+        </inkml:channelProperties>
+      </inkml:inkSource>
+      <inkml:timestamp xml:id="ts0" timeString="2022-03-06T12:24:55.861"/>
+    </inkml:context>
+    <inkml:brush xml:id="br0">
+      <inkml:brushProperty name="width" value="0.05" units="cm"/>
+      <inkml:brushProperty name="height" value="0.05" units="cm"/>
+      <inkml:brushProperty name="color" value="#E71224"/>
+    </inkml:brush>
+  </inkml:definitions>
+  <inkml:trace contextRef="#ctx0" brushRef="#br0">23 195 24575,'-3'0'0,"-2"-4"0,0-12 0,1-7 0,2-4 0,0 0 0,1 0 0,1 1 0,0 1 0,0 5-8191</inkml:trace>
+</inkml:ink>
+</file>
+
+<file path=ppt/ink/ink20.xml><?xml version="1.0" encoding="utf-8"?>
+<inkml:ink xmlns:inkml="http://www.w3.org/2003/InkML">
+  <inkml:definitions>
+    <inkml:context xml:id="ctx0">
+      <inkml:inkSource xml:id="inkSrc0">
+        <inkml:traceFormat>
+          <inkml:channel name="X" type="integer" min="-2.14748E9" max="2.14748E9" units="cm"/>
+          <inkml:channel name="Y" type="integer" min="-2.14748E9" max="2.14748E9" units="cm"/>
+          <inkml:channel name="F" type="integer" max="32767" units="dev"/>
+        </inkml:traceFormat>
+        <inkml:channelProperties>
+          <inkml:channelProperty channel="X" name="resolution" value="1000" units="1/cm"/>
+          <inkml:channelProperty channel="Y" name="resolution" value="1000" units="1/cm"/>
+          <inkml:channelProperty channel="F" name="resolution" value="0" units="1/dev"/>
+        </inkml:channelProperties>
+      </inkml:inkSource>
+      <inkml:timestamp xml:id="ts0" timeString="2022-03-06T12:25:16.744"/>
+    </inkml:context>
+    <inkml:brush xml:id="br0">
+      <inkml:brushProperty name="width" value="0.05" units="cm"/>
+      <inkml:brushProperty name="height" value="0.05" units="cm"/>
+      <inkml:brushProperty name="color" value="#E71224"/>
+    </inkml:brush>
+  </inkml:definitions>
+  <inkml:trace contextRef="#ctx0" brushRef="#br0">0 0 24575,'0'0'-8191</inkml:trace>
+</inkml:ink>
+</file>
+
+<file path=ppt/ink/ink21.xml><?xml version="1.0" encoding="utf-8"?>
+<inkml:ink xmlns:inkml="http://www.w3.org/2003/InkML">
+  <inkml:definitions>
+    <inkml:context xml:id="ctx0">
+      <inkml:inkSource xml:id="inkSrc0">
+        <inkml:traceFormat>
+          <inkml:channel name="X" type="integer" min="-2.14748E9" max="2.14748E9" units="cm"/>
+          <inkml:channel name="Y" type="integer" min="-2.14748E9" max="2.14748E9" units="cm"/>
+          <inkml:channel name="F" type="integer" max="32767" units="dev"/>
+        </inkml:traceFormat>
+        <inkml:channelProperties>
+          <inkml:channelProperty channel="X" name="resolution" value="1000" units="1/cm"/>
+          <inkml:channelProperty channel="Y" name="resolution" value="1000" units="1/cm"/>
+          <inkml:channelProperty channel="F" name="resolution" value="0" units="1/dev"/>
+        </inkml:channelProperties>
+      </inkml:inkSource>
+      <inkml:timestamp xml:id="ts0" timeString="2022-03-06T12:25:17.539"/>
+    </inkml:context>
+    <inkml:brush xml:id="br0">
+      <inkml:brushProperty name="width" value="0.05" units="cm"/>
+      <inkml:brushProperty name="height" value="0.05" units="cm"/>
+      <inkml:brushProperty name="color" value="#E71224"/>
+    </inkml:brush>
+  </inkml:definitions>
+  <inkml:trace contextRef="#ctx0" brushRef="#br0">0 1 24575,'1'13'0,"0"0"0,1 1 0,1-1 0,0 0 0,0-1 0,9 21 0,40 74 0,-30-64 0,11 22 0,104 234 0,-121-244-1365,-13-34-5461</inkml:trace>
+</inkml:ink>
+</file>
+
+<file path=ppt/ink/ink22.xml><?xml version="1.0" encoding="utf-8"?>
+<inkml:ink xmlns:inkml="http://www.w3.org/2003/InkML">
+  <inkml:definitions>
+    <inkml:context xml:id="ctx0">
+      <inkml:inkSource xml:id="inkSrc0">
+        <inkml:traceFormat>
+          <inkml:channel name="X" type="integer" min="-2.14748E9" max="2.14748E9" units="cm"/>
+          <inkml:channel name="Y" type="integer" min="-2.14748E9" max="2.14748E9" units="cm"/>
+          <inkml:channel name="F" type="integer" max="32767" units="dev"/>
+        </inkml:traceFormat>
+        <inkml:channelProperties>
+          <inkml:channelProperty channel="X" name="resolution" value="1000" units="1/cm"/>
+          <inkml:channelProperty channel="Y" name="resolution" value="1000" units="1/cm"/>
+          <inkml:channelProperty channel="F" name="resolution" value="0" units="1/dev"/>
+        </inkml:channelProperties>
+      </inkml:inkSource>
+      <inkml:timestamp xml:id="ts0" timeString="2022-03-06T12:25:18.582"/>
+    </inkml:context>
+    <inkml:brush xml:id="br0">
+      <inkml:brushProperty name="width" value="0.05" units="cm"/>
+      <inkml:brushProperty name="height" value="0.05" units="cm"/>
+      <inkml:brushProperty name="color" value="#E71224"/>
+    </inkml:brush>
+  </inkml:definitions>
+  <inkml:trace contextRef="#ctx0" brushRef="#br0">48 286 24575,'78'1'0,"86"-3"0,-162 2 0,0 0 0,0 0 0,0-1 0,0 1 0,0-1 0,0 0 0,0 1 0,-1-1 0,1 0 0,0 0 0,0 0 0,-1-1 0,1 1 0,-1 0 0,1 0 0,-1-1 0,0 1 0,1-1 0,-1 0 0,0 1 0,1-3 0,0 0 0,0-1 0,0 0 0,0 0 0,-1 1 0,0-1 0,0 0 0,0 0 0,0-8 0,-1 2 0,0-1 0,-1 0 0,0 0 0,-1 1 0,0-1 0,-1 1 0,-4-12 0,3 16 0,0 0 0,0 0 0,-1 1 0,0-1 0,0 1 0,0 0 0,-1 1 0,0-1 0,0 1 0,-1 0 0,1 0 0,-10-4 0,10 6 0,0-1 0,0 1 0,0 0 0,0 1 0,-1 0 0,1 0 0,-1 0 0,1 1 0,-1 0 0,0 0 0,0 1 0,1 0 0,-1 0 0,0 0 0,-6 2 0,8 0 0,0 0 0,1 0 0,-1 1 0,1 0 0,0 0 0,0 0 0,0 0 0,0 1 0,0-1 0,1 1 0,-1 0 0,1 0 0,0 1 0,1-1 0,-4 7 0,-32 73 0,31-65 0,1 0 0,1 1 0,0 0 0,1 0 0,-1 37 0,4-47 0,2 0 0,-1 1 0,2-1 0,-1 0 0,1 0 0,1 0 0,0 0 0,0 0 0,1-1 0,0 1 0,1-1 0,0 0 0,7 10 0,1-1 0,2 0 0,0-1 0,1 0 0,1-1 0,30 22 0,-39-32 0,0-1 0,0 0 0,1-1 0,0 0 0,0 0 0,0-1 0,0 0 0,0 0 0,1-1 0,-1 0 0,1-1 0,-1 0 0,1-1 0,0 0 0,-1 0 0,11-2 0,-16 1 6,0 0 0,-1 0 0,1-1 0,0 1 0,-1-1 0,1 0 0,-1 0 0,0 0 0,0 0 0,1 0 0,-2-1 0,1 1 0,0-1 0,0 0 0,-1 0 0,1 0 0,-1 0 0,0 0 0,2-4 0,0-2-218,0 0 0,0-1 0,-1 1-1,0-1 1,-1 1 0,2-14 0,-2 2-6614</inkml:trace>
+</inkml:ink>
+</file>
+
+<file path=ppt/ink/ink23.xml><?xml version="1.0" encoding="utf-8"?>
+<inkml:ink xmlns:inkml="http://www.w3.org/2003/InkML">
+  <inkml:definitions>
+    <inkml:context xml:id="ctx0">
+      <inkml:inkSource xml:id="inkSrc0">
+        <inkml:traceFormat>
+          <inkml:channel name="X" type="integer" min="-2.14748E9" max="2.14748E9" units="cm"/>
+          <inkml:channel name="Y" type="integer" min="-2.14748E9" max="2.14748E9" units="cm"/>
+          <inkml:channel name="F" type="integer" max="32767" units="dev"/>
+        </inkml:traceFormat>
+        <inkml:channelProperties>
+          <inkml:channelProperty channel="X" name="resolution" value="1000" units="1/cm"/>
+          <inkml:channelProperty channel="Y" name="resolution" value="1000" units="1/cm"/>
+          <inkml:channelProperty channel="F" name="resolution" value="0" units="1/dev"/>
+        </inkml:channelProperties>
+      </inkml:inkSource>
+      <inkml:timestamp xml:id="ts0" timeString="2022-03-06T12:25:18.939"/>
+    </inkml:context>
+    <inkml:brush xml:id="br0">
+      <inkml:brushProperty name="width" value="0.05" units="cm"/>
+      <inkml:brushProperty name="height" value="0.05" units="cm"/>
+      <inkml:brushProperty name="color" value="#E71224"/>
+    </inkml:brush>
+  </inkml:definitions>
+  <inkml:trace contextRef="#ctx0" brushRef="#br0">1 0 24575,'3'0'0</inkml:trace>
+</inkml:ink>
+</file>
+
+<file path=ppt/ink/ink24.xml><?xml version="1.0" encoding="utf-8"?>
+<inkml:ink xmlns:inkml="http://www.w3.org/2003/InkML">
+  <inkml:definitions>
+    <inkml:context xml:id="ctx0">
+      <inkml:inkSource xml:id="inkSrc0">
+        <inkml:traceFormat>
+          <inkml:channel name="X" type="integer" min="-2.14748E9" max="2.14748E9" units="cm"/>
+          <inkml:channel name="Y" type="integer" min="-2.14748E9" max="2.14748E9" units="cm"/>
+          <inkml:channel name="F" type="integer" max="32767" units="dev"/>
+        </inkml:traceFormat>
+        <inkml:channelProperties>
+          <inkml:channelProperty channel="X" name="resolution" value="1000" units="1/cm"/>
+          <inkml:channelProperty channel="Y" name="resolution" value="1000" units="1/cm"/>
+          <inkml:channelProperty channel="F" name="resolution" value="0" units="1/dev"/>
+        </inkml:channelProperties>
+      </inkml:inkSource>
+      <inkml:timestamp xml:id="ts0" timeString="2022-03-06T12:25:43.347"/>
+    </inkml:context>
+    <inkml:brush xml:id="br0">
+      <inkml:brushProperty name="width" value="0.05" units="cm"/>
+      <inkml:brushProperty name="height" value="0.05" units="cm"/>
+      <inkml:brushProperty name="color" value="#E71224"/>
+    </inkml:brush>
+  </inkml:definitions>
+  <inkml:trace contextRef="#ctx0" brushRef="#br0">1 1 24575,'0'4'0,"0"4"0,0 6 0,0 10 0,0 6 0,0 1 0,0-1 0,0-2 0,0-1 0,0-7-8191</inkml:trace>
+</inkml:ink>
+</file>
+
+<file path=ppt/ink/ink25.xml><?xml version="1.0" encoding="utf-8"?>
+<inkml:ink xmlns:inkml="http://www.w3.org/2003/InkML">
+  <inkml:definitions>
+    <inkml:context xml:id="ctx0">
+      <inkml:inkSource xml:id="inkSrc0">
+        <inkml:traceFormat>
+          <inkml:channel name="X" type="integer" min="-2.14748E9" max="2.14748E9" units="cm"/>
+          <inkml:channel name="Y" type="integer" min="-2.14748E9" max="2.14748E9" units="cm"/>
+          <inkml:channel name="F" type="integer" max="32767" units="dev"/>
+        </inkml:traceFormat>
+        <inkml:channelProperties>
+          <inkml:channelProperty channel="X" name="resolution" value="1000" units="1/cm"/>
+          <inkml:channelProperty channel="Y" name="resolution" value="1000" units="1/cm"/>
+          <inkml:channelProperty channel="F" name="resolution" value="0" units="1/dev"/>
+        </inkml:channelProperties>
+      </inkml:inkSource>
+      <inkml:timestamp xml:id="ts0" timeString="2022-03-06T12:25:44.731"/>
+    </inkml:context>
+    <inkml:brush xml:id="br0">
+      <inkml:brushProperty name="width" value="0.05" units="cm"/>
+      <inkml:brushProperty name="height" value="0.05" units="cm"/>
+      <inkml:brushProperty name="color" value="#E71224"/>
+    </inkml:brush>
+  </inkml:definitions>
+  <inkml:trace contextRef="#ctx0" brushRef="#br0">359 463 24575,'-1'-12'0,"-1"-1"0,-1 0 0,0 1 0,0 0 0,-1 0 0,-1 0 0,-10-20 0,-13-37 0,11-22 0,15 74 0,0 0 0,-1 1 0,-1-1 0,0 1 0,-2-1 0,0 1 0,-10-19 0,14 32 0,-1 0 0,0 1 0,0-1 0,0 0 0,0 1 0,0-1 0,-1 1 0,1 0 0,-1 0 0,1 1 0,-1-1 0,0 1 0,0 0 0,0 0 0,0 0 0,0 0 0,0 1 0,0-1 0,0 1 0,0 0 0,0 0 0,0 1 0,0-1 0,-6 2 0,-4 1 0,1-1 0,0 2 0,0 0 0,1 0 0,-1 1 0,-14 8 0,9-2-1365,3-2-5461</inkml:trace>
+</inkml:ink>
+</file>
+
+<file path=ppt/ink/ink3.xml><?xml version="1.0" encoding="utf-8"?>
+<inkml:ink xmlns:inkml="http://www.w3.org/2003/InkML">
+  <inkml:definitions>
+    <inkml:context xml:id="ctx0">
+      <inkml:inkSource xml:id="inkSrc0">
+        <inkml:traceFormat>
+          <inkml:channel name="X" type="integer" min="-2.14748E9" max="2.14748E9" units="cm"/>
+          <inkml:channel name="Y" type="integer" min="-2.14748E9" max="2.14748E9" units="cm"/>
+          <inkml:channel name="F" type="integer" max="32767" units="dev"/>
+        </inkml:traceFormat>
+        <inkml:channelProperties>
+          <inkml:channelProperty channel="X" name="resolution" value="1000" units="1/cm"/>
+          <inkml:channelProperty channel="Y" name="resolution" value="1000" units="1/cm"/>
+          <inkml:channelProperty channel="F" name="resolution" value="0" units="1/dev"/>
+        </inkml:channelProperties>
+      </inkml:inkSource>
+      <inkml:timestamp xml:id="ts0" timeString="2022-03-06T12:24:57.223"/>
+    </inkml:context>
+    <inkml:brush xml:id="br0">
+      <inkml:brushProperty name="width" value="0.05" units="cm"/>
+      <inkml:brushProperty name="height" value="0.05" units="cm"/>
+      <inkml:brushProperty name="color" value="#E71224"/>
+    </inkml:brush>
+  </inkml:definitions>
+  <inkml:trace contextRef="#ctx0" brushRef="#br0">1 762 24575,'37'-16'0,"39"-14"0,-2-4 0,-1-4 0,108-72 0,-149 88 0,1 1 0,1 2 0,55-23 0,117-33 0,-87 34 0,97-26 0,-51 18 0,-46 14 0,177-28 0,-59 40 0,-19 3 0,-106 5-13,-41 7-663,80-20 0,-129 22-6150</inkml:trace>
+</inkml:ink>
+</file>
+
+<file path=ppt/ink/ink4.xml><?xml version="1.0" encoding="utf-8"?>
+<inkml:ink xmlns:inkml="http://www.w3.org/2003/InkML">
+  <inkml:definitions>
+    <inkml:context xml:id="ctx0">
+      <inkml:inkSource xml:id="inkSrc0">
+        <inkml:traceFormat>
+          <inkml:channel name="X" type="integer" min="-2.14748E9" max="2.14748E9" units="cm"/>
+          <inkml:channel name="Y" type="integer" min="-2.14748E9" max="2.14748E9" units="cm"/>
+          <inkml:channel name="F" type="integer" max="32767" units="dev"/>
+        </inkml:traceFormat>
+        <inkml:channelProperties>
+          <inkml:channelProperty channel="X" name="resolution" value="1000" units="1/cm"/>
+          <inkml:channelProperty channel="Y" name="resolution" value="1000" units="1/cm"/>
+          <inkml:channelProperty channel="F" name="resolution" value="0" units="1/dev"/>
+        </inkml:channelProperties>
+      </inkml:inkSource>
+      <inkml:timestamp xml:id="ts0" timeString="2022-03-06T12:24:58.326"/>
+    </inkml:context>
+    <inkml:brush xml:id="br0">
+      <inkml:brushProperty name="width" value="0.05" units="cm"/>
+      <inkml:brushProperty name="height" value="0.05" units="cm"/>
+      <inkml:brushProperty name="color" value="#E71224"/>
+    </inkml:brush>
+  </inkml:definitions>
+  <inkml:trace contextRef="#ctx0" brushRef="#br0">362 1 24575,'-14'0'0,"0"1"0,1 1 0,-1 0 0,1 0 0,-1 2 0,1 0 0,0 0 0,0 1 0,1 1 0,-1 0 0,1 0 0,-18 15 0,13-8 0,2 0 0,0 1 0,0 1 0,1 1 0,1 0 0,1 1 0,-18 31 0,23-37 0,0 1 0,1 0 0,1 0 0,0 1 0,-6 24 0,10-34 0,1-1 0,0 1 0,-1 0 0,1-1 0,1 1 0,-1 0 0,0-1 0,1 1 0,-1 0 0,1-1 0,0 1 0,0-1 0,0 1 0,0-1 0,0 1 0,0-1 0,1 0 0,-1 0 0,1 0 0,0 1 0,0-1 0,0-1 0,0 1 0,0 0 0,0 0 0,0-1 0,0 1 0,1-1 0,-1 0 0,0 0 0,1 0 0,-1 0 0,1 0 0,0 0 0,4 0 0,4 1-91,0 0 0,0-1 0,0-1 0,0 1 0,1-2 0,-1 0 0,0 0 0,0-1 0,0 0 0,0-1 0,-1 0 0,1-1 0,-1 0 0,14-8 0,-4 1-6735</inkml:trace>
+</inkml:ink>
+</file>
+
+<file path=ppt/ink/ink5.xml><?xml version="1.0" encoding="utf-8"?>
+<inkml:ink xmlns:inkml="http://www.w3.org/2003/InkML">
+  <inkml:definitions>
+    <inkml:context xml:id="ctx0">
+      <inkml:inkSource xml:id="inkSrc0">
+        <inkml:traceFormat>
+          <inkml:channel name="X" type="integer" min="-2.14748E9" max="2.14748E9" units="cm"/>
+          <inkml:channel name="Y" type="integer" min="-2.14748E9" max="2.14748E9" units="cm"/>
+          <inkml:channel name="F" type="integer" max="32767" units="dev"/>
+        </inkml:traceFormat>
+        <inkml:channelProperties>
+          <inkml:channelProperty channel="X" name="resolution" value="1000" units="1/cm"/>
+          <inkml:channelProperty channel="Y" name="resolution" value="1000" units="1/cm"/>
+          <inkml:channelProperty channel="F" name="resolution" value="0" units="1/dev"/>
+        </inkml:channelProperties>
+      </inkml:inkSource>
+      <inkml:timestamp xml:id="ts0" timeString="2022-03-06T12:25:00.425"/>
+    </inkml:context>
+    <inkml:brush xml:id="br0">
+      <inkml:brushProperty name="width" value="0.05" units="cm"/>
+      <inkml:brushProperty name="height" value="0.05" units="cm"/>
+      <inkml:brushProperty name="color" value="#E71224"/>
+    </inkml:brush>
+  </inkml:definitions>
+  <inkml:trace contextRef="#ctx0" brushRef="#br0">98 50 24575,'-2'0'0,"0"1"0,0-1 0,0 1 0,0-1 0,0 1 0,0 0 0,0 0 0,0 0 0,0 0 0,0 0 0,1 0 0,-1 1 0,0-1 0,1 1 0,-1-1 0,1 1 0,-1 0 0,1-1 0,0 1 0,0 0 0,0 0 0,0 0 0,0 0 0,0 0 0,0 0 0,1 0 0,-1 0 0,1 0 0,-1 0 0,1 0 0,0 0 0,0 3 0,-2 11 0,1 0 0,1 0 0,1 18 0,-1-29 0,1 1 0,1-1 0,-1 1 0,1 0 0,0 0 0,1-1 0,-1 1 0,1-1 0,0 0 0,1 0 0,-1 0 0,1 0 0,0-1 0,0 1 0,0-1 0,1 0 0,-1 0 0,7 3 0,-6-3 0,0 0 0,0-1 0,0 0 0,1 0 0,-1 0 0,1-1 0,0 0 0,-1 0 0,1 0 0,0-1 0,0 0 0,0 0 0,0 0 0,0-1 0,0 0 0,1 0 0,5-1 0,-9-1 0,-1 1 0,0 0 0,1-1 0,-1 0 0,0 0 0,0 1 0,0-1 0,0 0 0,0-1 0,-1 1 0,1 0 0,-1 0 0,1-1 0,-1 1 0,0-1 0,0 1 0,0-1 0,0 1 0,-1-1 0,1 0 0,0 1 0,-1-1 0,0 0 0,0 0 0,0 1 0,0-4 0,0-10 0,0 0 0,-1 0 0,-4-18 0,4 28 0,-1 0 0,-1 0 0,1 0 0,-1 0 0,0 1 0,0-1 0,-1 1 0,1 0 0,-1 0 0,0 0 0,-1 0 0,1 1 0,-1 0 0,0 0 0,0 0 0,0 0 0,-8-3 0,3 1 0,0 1 0,-1 0 0,0 1 0,0 0 0,0 0 0,0 1 0,0 1 0,-19-2 0,28 3 0,-1 1 0,1 0 0,0 0 0,0 1 0,0-1 0,0 0 0,-1 1 0,1-1 0,0 1 0,0 0 0,0-1 0,0 1 0,0 0 0,0 0 0,1 1 0,-1-1 0,0 0 0,0 1 0,1-1 0,-1 1 0,-1 1 0,1 1 0,0-1 0,0 1 0,0 0 0,0 0 0,1 0 0,-1 0 0,1 0 0,0 0 0,0 1 0,0 4 0,0 12 0,1-1 0,1 0 0,6 33 0,-6-44 0,0-5 0,0 0 0,1 0 0,-1 0 0,1-1 0,0 1 0,0 0 0,0-1 0,0 0 0,1 1 0,-1-1 0,1 0 0,0 0 0,0-1 0,0 1 0,0-1 0,1 1 0,-1-1 0,1 0 0,-1 0 0,1 0 0,0-1 0,-1 1 0,1-1 0,0 0 0,0 0 0,0 0 0,0-1 0,0 0 0,0 1 0,1-1 0,4-1 0,-4 1 0,0 0 0,0 0 0,0 0 0,0-1 0,-1 1 0,1-1 0,0 0 0,0-1 0,-1 1 0,1-1 0,-1 0 0,1 0 0,-1-1 0,0 1 0,0-1 0,0 0 0,0 0 0,-1 0 0,1 0 0,-1-1 0,1 0 0,-1 1 0,-1-1 0,1 0 0,0-1 0,2-5 0,0-10 0,-2-1 0,0 1 0,0-37 0,3-24 0,1 53 0,-7 28 0,-1 0 0,1 0 0,0 0 0,0-1 0,0 1 0,0 0 0,0 0 0,1 0 0,-1 0 0,0 0 0,0 0 0,0 0 0,0-1 0,0 1 0,0 0 0,0 0 0,0 0 0,0 0 0,0 0 0,0 0 0,0 0 0,0-1 0,0 1 0,1 0 0,-1 0 0,0 0 0,0 0 0,0 0 0,0 0 0,0 0 0,0 0 0,0 0 0,1 0 0,-1 0 0,0 0 0,0 0 0,0 0 0,0 0 0,0 0 0,0 0 0,0 0 0,1 0 0,-1 0 0,0 0 0,0 0 0,0 0 0,0 0 0,0 0 0,0 0 0,1 0 0,-1 0 0,0 0 0,0 0 0,0 0 0,0 0 0,0 0 0,0 0 0,0 0 0,0 1 0,1-1 0,-1 0 0,0 0 0,0 0 0,0 0 0,0 0 0,0 1 0,10 39 0,-5-15 0,-3-15 12,1 0 0,1 0 0,-1 0 0,2 0 0,-1 0 0,1-1 0,1 0 0,-1 0 0,9 8 0,-11-13-74,0-1 0,0 0 0,0 0 0,1 0 1,-1 0-1,1 0 0,0-1 0,0 0 0,0 0 0,0 0 0,0 0 0,1 0 1,-1-1-1,0 0 0,1 0 0,-1 0 0,1 0 0,-1-1 0,1 0 0,-1 0 1,1 0-1,0 0 0,5-2 0,11-4-6764</inkml:trace>
+</inkml:ink>
+</file>
+
+<file path=ppt/ink/ink6.xml><?xml version="1.0" encoding="utf-8"?>
+<inkml:ink xmlns:inkml="http://www.w3.org/2003/InkML">
+  <inkml:definitions>
+    <inkml:context xml:id="ctx0">
+      <inkml:inkSource xml:id="inkSrc0">
+        <inkml:traceFormat>
+          <inkml:channel name="X" type="integer" min="-2.14748E9" max="2.14748E9" units="cm"/>
+          <inkml:channel name="Y" type="integer" min="-2.14748E9" max="2.14748E9" units="cm"/>
+          <inkml:channel name="F" type="integer" max="32767" units="dev"/>
+        </inkml:traceFormat>
+        <inkml:channelProperties>
+          <inkml:channelProperty channel="X" name="resolution" value="1000" units="1/cm"/>
+          <inkml:channelProperty channel="Y" name="resolution" value="1000" units="1/cm"/>
+          <inkml:channelProperty channel="F" name="resolution" value="0" units="1/dev"/>
+        </inkml:channelProperties>
+      </inkml:inkSource>
+      <inkml:timestamp xml:id="ts0" timeString="2022-03-06T12:25:01.375"/>
+    </inkml:context>
+    <inkml:brush xml:id="br0">
+      <inkml:brushProperty name="width" value="0.05" units="cm"/>
+      <inkml:brushProperty name="height" value="0.05" units="cm"/>
+      <inkml:brushProperty name="color" value="#E71224"/>
+    </inkml:brush>
+  </inkml:definitions>
+  <inkml:trace contextRef="#ctx0" brushRef="#br0">1 77 24575,'0'231'0,"3"-261"0,1 0 0,1 0 0,2 1 0,1 0 0,1 0 0,24-51 0,-31 76 0,1 0 0,0 1 0,-1-1 0,2 1 0,-1 0 0,0 0 0,1 0 0,-1 0 0,1 1 0,0-1 0,0 1 0,0 0 0,0 0 0,1 0 0,-1 1 0,0-1 0,1 1 0,-1 0 0,1 1 0,6-1 0,-1 0 0,1 0 0,-1 1 0,0 1 0,1 0 0,-1 0 0,0 1 0,0 0 0,13 5 0,-18-5 6,0 0 0,1 1 0,-1 0 0,0 0 0,-1 0 0,1 1 0,0 0 0,-1-1 0,0 2 0,0-1 0,0 0 0,-1 1 0,1 0 0,-1-1 0,0 1 0,0 1 0,-1-1 0,1 0 0,1 7 0,0 2-254,-1 1 1,0 0-1,-1 0 1,-1 1-1,0 29 1,-2-22-6579</inkml:trace>
+</inkml:ink>
+</file>
+
+<file path=ppt/ink/ink7.xml><?xml version="1.0" encoding="utf-8"?>
+<inkml:ink xmlns:inkml="http://www.w3.org/2003/InkML">
+  <inkml:definitions>
+    <inkml:context xml:id="ctx0">
+      <inkml:inkSource xml:id="inkSrc0">
+        <inkml:traceFormat>
+          <inkml:channel name="X" type="integer" min="-2.14748E9" max="2.14748E9" units="cm"/>
+          <inkml:channel name="Y" type="integer" min="-2.14748E9" max="2.14748E9" units="cm"/>
+          <inkml:channel name="F" type="integer" max="32767" units="dev"/>
+        </inkml:traceFormat>
+        <inkml:channelProperties>
+          <inkml:channelProperty channel="X" name="resolution" value="1000" units="1/cm"/>
+          <inkml:channelProperty channel="Y" name="resolution" value="1000" units="1/cm"/>
+          <inkml:channelProperty channel="F" name="resolution" value="0" units="1/dev"/>
+        </inkml:channelProperties>
+      </inkml:inkSource>
+      <inkml:timestamp xml:id="ts0" timeString="2022-03-06T12:25:02.334"/>
+    </inkml:context>
+    <inkml:brush xml:id="br0">
+      <inkml:brushProperty name="width" value="0.05" units="cm"/>
+      <inkml:brushProperty name="height" value="0.05" units="cm"/>
+      <inkml:brushProperty name="color" value="#E71224"/>
+    </inkml:brush>
+  </inkml:definitions>
+  <inkml:trace contextRef="#ctx0" brushRef="#br0">91 154 24575,'-83'240'0,"83"-240"0,0 0 0,0 0 0,0 0 0,0 0 0,0-1 0,0 1 0,0 0 0,0 0 0,0 0 0,0 0 0,0 0 0,0 0 0,0 0 0,0 0 0,0 0 0,0 0 0,0-1 0,0 1 0,0 0 0,0 0 0,0 0 0,0 0 0,-1 0 0,1 0 0,0 0 0,0 0 0,0 0 0,0 0 0,0 0 0,0 0 0,0 0 0,0 0 0,0 0 0,0 0 0,-1 0 0,1-1 0,0 1 0,0 0 0,0 0 0,0 0 0,0 0 0,0 0 0,0 0 0,0 0 0,0 1 0,-1-1 0,1 0 0,0 0 0,0 0 0,0 0 0,0 0 0,-2-19 0,0-24 0,2-35 0,3-98 0,-3 172 0,1 1 0,-1 0 0,0 0 0,1 0 0,0-1 0,0 1 0,0 0 0,0 0 0,0 0 0,0 0 0,1 0 0,0 0 0,-1 1 0,1-1 0,0 0 0,0 1 0,1 0 0,-1-1 0,0 1 0,1 0 0,0 0 0,-1 0 0,1 1 0,0-1 0,0 0 0,0 1 0,0 0 0,0 0 0,0 0 0,0 0 0,4 0 0,-3 0 0,0 1 0,0 0 0,0 1 0,0-1 0,-1 1 0,1-1 0,0 1 0,0 0 0,-1 0 0,1 1 0,-1-1 0,1 1 0,-1 0 0,1 0 0,-1 0 0,0 0 0,0 0 0,0 1 0,0 0 0,-1-1 0,1 1 0,-1 0 0,1 0 0,-1 0 0,0 1 0,2 3 0,1 6 0,0 0 0,-1 0 0,0 0 0,-1 0 0,-1 1 0,0-1 0,1 17 0,-5 103 0,0-72 0,0 21-1365,2-53-5461</inkml:trace>
+</inkml:ink>
+</file>
+
+<file path=ppt/ink/ink8.xml><?xml version="1.0" encoding="utf-8"?>
+<inkml:ink xmlns:inkml="http://www.w3.org/2003/InkML">
+  <inkml:definitions>
+    <inkml:context xml:id="ctx0">
+      <inkml:inkSource xml:id="inkSrc0">
+        <inkml:traceFormat>
+          <inkml:channel name="X" type="integer" min="-2.14748E9" max="2.14748E9" units="cm"/>
+          <inkml:channel name="Y" type="integer" min="-2.14748E9" max="2.14748E9" units="cm"/>
+          <inkml:channel name="F" type="integer" max="32767" units="dev"/>
+        </inkml:traceFormat>
+        <inkml:channelProperties>
+          <inkml:channelProperty channel="X" name="resolution" value="1000" units="1/cm"/>
+          <inkml:channelProperty channel="Y" name="resolution" value="1000" units="1/cm"/>
+          <inkml:channelProperty channel="F" name="resolution" value="0" units="1/dev"/>
+        </inkml:channelProperties>
+      </inkml:inkSource>
+      <inkml:timestamp xml:id="ts0" timeString="2022-03-06T12:25:03.287"/>
+    </inkml:context>
+    <inkml:brush xml:id="br0">
+      <inkml:brushProperty name="width" value="0.05" units="cm"/>
+      <inkml:brushProperty name="height" value="0.05" units="cm"/>
+      <inkml:brushProperty name="color" value="#E71224"/>
+    </inkml:brush>
+  </inkml:definitions>
+  <inkml:trace contextRef="#ctx0" brushRef="#br0">181 65 24575,'-2'1'0,"1"0"0,0-1 0,-1 1 0,1 0 0,0 0 0,0-1 0,0 1 0,-1 0 0,1 0 0,0 1 0,0-1 0,0 0 0,1 0 0,-1 0 0,0 1 0,0-1 0,1 0 0,-1 1 0,0 2 0,-11 30 0,8-20 0,1 1 0,0 0 0,1 0 0,1 0 0,1 0 0,0 0 0,1 0 0,3 19 0,-4-32 0,1 0 0,-1 0 0,1 0 0,0 0 0,0 0 0,0 0 0,0 0 0,0-1 0,0 1 0,1 0 0,-1-1 0,1 1 0,-1-1 0,1 1 0,-1-1 0,1 0 0,0 1 0,-1-1 0,1 0 0,0 0 0,0 0 0,0-1 0,0 1 0,0 0 0,0-1 0,0 1 0,0-1 0,0 0 0,1 1 0,-1-1 0,0 0 0,0-1 0,0 1 0,0 0 0,0 0 0,0-1 0,0 1 0,3-2 0,0 0 0,1 0 0,-1 0 0,0 0 0,0-1 0,0 0 0,0 0 0,-1 0 0,1 0 0,-1-1 0,0 0 0,0 0 0,0 0 0,4-6 0,-1-1 0,-1-1 0,0 0 0,-1 0 0,-1-1 0,0 1 0,-1-1 0,0 0 0,1-13 0,-3 22 0,0-1 0,-1 1 0,1 0 0,-1-1 0,0 1 0,0 0 0,-1-1 0,0 1 0,1 0 0,-1 0 0,-1-1 0,1 1 0,0 0 0,-1 0 0,0 0 0,0 0 0,0 1 0,-1-1 0,1 1 0,-1-1 0,0 1 0,0 0 0,0 0 0,0 0 0,-1 0 0,1 0 0,-7-3 0,-4 1 0,0 0 0,-1 0 0,1 1 0,-1 1 0,0 1 0,0 0 0,-25 0 0,36 3 5,-1 0 1,0 0-1,1 0 0,0 1 0,-1-1 0,1 1 1,0 0-1,0 1 0,0-1 0,0 1 1,0-1-1,1 1 0,-1 0 0,1 1 0,0-1 1,-1 1-1,2-1 0,-1 1 0,0 0 0,1 0 1,0 0-1,-4 8 0,-1 4-302,0 1 0,1-1 0,1 1 0,-6 30 0,7-18-6529</inkml:trace>
+</inkml:ink>
+</file>
+
+<file path=ppt/ink/ink9.xml><?xml version="1.0" encoding="utf-8"?>
+<inkml:ink xmlns:inkml="http://www.w3.org/2003/InkML">
+  <inkml:definitions>
+    <inkml:context xml:id="ctx0">
+      <inkml:inkSource xml:id="inkSrc0">
+        <inkml:traceFormat>
+          <inkml:channel name="X" type="integer" min="-2.14748E9" max="2.14748E9" units="cm"/>
+          <inkml:channel name="Y" type="integer" min="-2.14748E9" max="2.14748E9" units="cm"/>
+          <inkml:channel name="F" type="integer" max="32767" units="dev"/>
+        </inkml:traceFormat>
+        <inkml:channelProperties>
+          <inkml:channelProperty channel="X" name="resolution" value="1000" units="1/cm"/>
+          <inkml:channelProperty channel="Y" name="resolution" value="1000" units="1/cm"/>
+          <inkml:channelProperty channel="F" name="resolution" value="0" units="1/dev"/>
+        </inkml:channelProperties>
+      </inkml:inkSource>
+      <inkml:timestamp xml:id="ts0" timeString="2022-03-06T12:25:03.856"/>
+    </inkml:context>
+    <inkml:brush xml:id="br0">
+      <inkml:brushProperty name="width" value="0.05" units="cm"/>
+      <inkml:brushProperty name="height" value="0.05" units="cm"/>
+      <inkml:brushProperty name="color" value="#E71224"/>
+    </inkml:brush>
+  </inkml:definitions>
+  <inkml:trace contextRef="#ctx0" brushRef="#br0">17 1 24575,'2'202'0,"-4"219"0,-11-305-1365,9-90-5461</inkml:trace>
+</inkml:ink>
+</file>
+
 <file path=ppt/notesMasters/notesMaster1.xml><?xml version="1.0" encoding="utf-8"?>
 <p:notesMaster xmlns:a="http://schemas.openxmlformats.org/drawingml/2006/main" xmlns:r="http://schemas.openxmlformats.org/officeDocument/2006/relationships" xmlns:p="http://schemas.openxmlformats.org/presentationml/2006/main">
   <p:cSld>
@@ -214,7 +914,7 @@
           <a:p>
             <a:fld id="{73813B16-28C2-4589-B6A8-9C3C9710AFC8}" type="datetimeFigureOut">
               <a:rPr lang="tr-TR" smtClean="0"/>
-              <a:t>2.03.2021</a:t>
+              <a:t>6.03.2022</a:t>
             </a:fld>
             <a:endParaRPr lang="tr-TR"/>
           </a:p>
@@ -481,6 +1181,90 @@
 </p:notesMaster>
 </file>
 
+<file path=ppt/notesSlides/notesSlide1.xml><?xml version="1.0" encoding="utf-8"?>
+<p:notes xmlns:a="http://schemas.openxmlformats.org/drawingml/2006/main" xmlns:r="http://schemas.openxmlformats.org/officeDocument/2006/relationships" xmlns:p="http://schemas.openxmlformats.org/presentationml/2006/main">
+  <p:cSld>
+    <p:spTree>
+      <p:nvGrpSpPr>
+        <p:cNvPr id="1" name=""/>
+        <p:cNvGrpSpPr/>
+        <p:nvPr/>
+      </p:nvGrpSpPr>
+      <p:grpSpPr>
+        <a:xfrm>
+          <a:off x="0" y="0"/>
+          <a:ext cx="0" cy="0"/>
+          <a:chOff x="0" y="0"/>
+          <a:chExt cx="0" cy="0"/>
+        </a:xfrm>
+      </p:grpSpPr>
+      <p:sp>
+        <p:nvSpPr>
+          <p:cNvPr id="2" name="Slide Image Placeholder 1"/>
+          <p:cNvSpPr>
+            <a:spLocks noGrp="1" noRot="1" noChangeAspect="1"/>
+          </p:cNvSpPr>
+          <p:nvPr>
+            <p:ph type="sldImg"/>
+          </p:nvPr>
+        </p:nvSpPr>
+        <p:spPr/>
+      </p:sp>
+      <p:sp>
+        <p:nvSpPr>
+          <p:cNvPr id="3" name="Notes Placeholder 2"/>
+          <p:cNvSpPr>
+            <a:spLocks noGrp="1"/>
+          </p:cNvSpPr>
+          <p:nvPr>
+            <p:ph type="body" idx="1"/>
+          </p:nvPr>
+        </p:nvSpPr>
+        <p:spPr/>
+        <p:txBody>
+          <a:bodyPr/>
+          <a:lstStyle/>
+          <a:p>
+            <a:endParaRPr lang="tr-TR" dirty="0"/>
+          </a:p>
+        </p:txBody>
+      </p:sp>
+      <p:sp>
+        <p:nvSpPr>
+          <p:cNvPr id="4" name="Slide Number Placeholder 3"/>
+          <p:cNvSpPr>
+            <a:spLocks noGrp="1"/>
+          </p:cNvSpPr>
+          <p:nvPr>
+            <p:ph type="sldNum" sz="quarter" idx="5"/>
+          </p:nvPr>
+        </p:nvSpPr>
+        <p:spPr/>
+        <p:txBody>
+          <a:bodyPr/>
+          <a:lstStyle/>
+          <a:p>
+            <a:fld id="{67EAFC98-8C56-452A-8885-644B13CC7827}" type="slidenum">
+              <a:rPr lang="tr-TR" smtClean="0"/>
+              <a:t>11</a:t>
+            </a:fld>
+            <a:endParaRPr lang="tr-TR"/>
+          </a:p>
+        </p:txBody>
+      </p:sp>
+    </p:spTree>
+    <p:extLst>
+      <p:ext uri="{BB962C8B-B14F-4D97-AF65-F5344CB8AC3E}">
+        <p14:creationId xmlns:p14="http://schemas.microsoft.com/office/powerpoint/2010/main" val="2979277218"/>
+      </p:ext>
+    </p:extLst>
+  </p:cSld>
+  <p:clrMapOvr>
+    <a:masterClrMapping/>
+  </p:clrMapOvr>
+</p:notes>
+</file>
+
 <file path=ppt/slideLayouts/slideLayout1.xml><?xml version="1.0" encoding="utf-8"?>
 <p:sldLayout xmlns:a="http://schemas.openxmlformats.org/drawingml/2006/main" xmlns:r="http://schemas.openxmlformats.org/officeDocument/2006/relationships" xmlns:p="http://schemas.openxmlformats.org/presentationml/2006/main" type="title" preserve="1">
   <p:cSld name="Başlık Slaydı">
@@ -636,7 +1420,7 @@
           <a:p>
             <a:fld id="{B8C54C95-7D1F-4A4B-9803-2822B70A5CA1}" type="datetimeFigureOut">
               <a:rPr lang="tr-TR" smtClean="0"/>
-              <a:t>2.03.2021</a:t>
+              <a:t>6.03.2022</a:t>
             </a:fld>
             <a:endParaRPr lang="tr-TR"/>
           </a:p>
@@ -1128,7 +1912,7 @@
           <a:p>
             <a:fld id="{B8C54C95-7D1F-4A4B-9803-2822B70A5CA1}" type="datetimeFigureOut">
               <a:rPr lang="tr-TR" smtClean="0"/>
-              <a:t>2.03.2021</a:t>
+              <a:t>6.03.2022</a:t>
             </a:fld>
             <a:endParaRPr lang="tr-TR"/>
           </a:p>
@@ -1336,7 +2120,7 @@
           <a:p>
             <a:fld id="{B8C54C95-7D1F-4A4B-9803-2822B70A5CA1}" type="datetimeFigureOut">
               <a:rPr lang="tr-TR" smtClean="0"/>
-              <a:t>2.03.2021</a:t>
+              <a:t>6.03.2022</a:t>
             </a:fld>
             <a:endParaRPr lang="tr-TR"/>
           </a:p>
@@ -1568,7 +2352,7 @@
           <a:p>
             <a:fld id="{B8C54C95-7D1F-4A4B-9803-2822B70A5CA1}" type="datetimeFigureOut">
               <a:rPr lang="tr-TR" smtClean="0"/>
-              <a:t>2.03.2021</a:t>
+              <a:t>6.03.2022</a:t>
             </a:fld>
             <a:endParaRPr lang="tr-TR"/>
           </a:p>
@@ -1914,7 +2698,7 @@
           <a:p>
             <a:fld id="{B8C54C95-7D1F-4A4B-9803-2822B70A5CA1}" type="datetimeFigureOut">
               <a:rPr lang="tr-TR" smtClean="0"/>
-              <a:t>2.03.2021</a:t>
+              <a:t>6.03.2022</a:t>
             </a:fld>
             <a:endParaRPr lang="tr-TR"/>
           </a:p>
@@ -2179,7 +2963,7 @@
           <a:p>
             <a:fld id="{B8C54C95-7D1F-4A4B-9803-2822B70A5CA1}" type="datetimeFigureOut">
               <a:rPr lang="tr-TR" smtClean="0"/>
-              <a:t>2.03.2021</a:t>
+              <a:t>6.03.2022</a:t>
             </a:fld>
             <a:endParaRPr lang="tr-TR"/>
           </a:p>
@@ -2591,7 +3375,7 @@
           <a:p>
             <a:fld id="{B8C54C95-7D1F-4A4B-9803-2822B70A5CA1}" type="datetimeFigureOut">
               <a:rPr lang="tr-TR" smtClean="0"/>
-              <a:t>2.03.2021</a:t>
+              <a:t>6.03.2022</a:t>
             </a:fld>
             <a:endParaRPr lang="tr-TR"/>
           </a:p>
@@ -2732,7 +3516,7 @@
           <a:p>
             <a:fld id="{B8C54C95-7D1F-4A4B-9803-2822B70A5CA1}" type="datetimeFigureOut">
               <a:rPr lang="tr-TR" smtClean="0"/>
-              <a:t>2.03.2021</a:t>
+              <a:t>6.03.2022</a:t>
             </a:fld>
             <a:endParaRPr lang="tr-TR"/>
           </a:p>
@@ -2845,7 +3629,7 @@
           <a:p>
             <a:fld id="{B8C54C95-7D1F-4A4B-9803-2822B70A5CA1}" type="datetimeFigureOut">
               <a:rPr lang="tr-TR" smtClean="0"/>
-              <a:t>2.03.2021</a:t>
+              <a:t>6.03.2022</a:t>
             </a:fld>
             <a:endParaRPr lang="tr-TR"/>
           </a:p>
@@ -3156,7 +3940,7 @@
           <a:p>
             <a:fld id="{B8C54C95-7D1F-4A4B-9803-2822B70A5CA1}" type="datetimeFigureOut">
               <a:rPr lang="tr-TR" smtClean="0"/>
-              <a:t>2.03.2021</a:t>
+              <a:t>6.03.2022</a:t>
             </a:fld>
             <a:endParaRPr lang="tr-TR"/>
           </a:p>
@@ -3444,7 +4228,7 @@
           <a:p>
             <a:fld id="{B8C54C95-7D1F-4A4B-9803-2822B70A5CA1}" type="datetimeFigureOut">
               <a:rPr lang="tr-TR" smtClean="0"/>
-              <a:t>2.03.2021</a:t>
+              <a:t>6.03.2022</a:t>
             </a:fld>
             <a:endParaRPr lang="tr-TR"/>
           </a:p>
@@ -3685,7 +4469,7 @@
           <a:p>
             <a:fld id="{B8C54C95-7D1F-4A4B-9803-2822B70A5CA1}" type="datetimeFigureOut">
               <a:rPr lang="tr-TR" smtClean="0"/>
-              <a:t>2.03.2021</a:t>
+              <a:t>6.03.2022</a:t>
             </a:fld>
             <a:endParaRPr lang="tr-TR"/>
           </a:p>
@@ -4914,6 +5698,1344 @@
           </a:p>
         </p:txBody>
       </p:sp>
+      <p:grpSp>
+        <p:nvGrpSpPr>
+          <p:cNvPr id="12" name="Group 11">
+            <a:extLst>
+              <a:ext uri="{FF2B5EF4-FFF2-40B4-BE49-F238E27FC236}">
+                <a16:creationId xmlns:a16="http://schemas.microsoft.com/office/drawing/2014/main" id="{1D7AE1C0-F6FD-4A23-842A-0D720A238A03}"/>
+              </a:ext>
+            </a:extLst>
+          </p:cNvPr>
+          <p:cNvGrpSpPr/>
+          <p:nvPr/>
+        </p:nvGrpSpPr>
+        <p:grpSpPr>
+          <a:xfrm>
+            <a:off x="2923833" y="2707634"/>
+            <a:ext cx="1460160" cy="407520"/>
+            <a:chOff x="2923833" y="2707634"/>
+            <a:chExt cx="1460160" cy="407520"/>
+          </a:xfrm>
+        </p:grpSpPr>
+        <mc:AlternateContent xmlns:mc="http://schemas.openxmlformats.org/markup-compatibility/2006">
+          <mc:Choice xmlns:p14="http://schemas.microsoft.com/office/powerpoint/2010/main" Requires="p14">
+            <p:contentPart p14:bwMode="auto" r:id="rId3">
+              <p14:nvContentPartPr>
+                <p14:cNvPr id="3" name="Ink 2">
+                  <a:extLst>
+                    <a:ext uri="{FF2B5EF4-FFF2-40B4-BE49-F238E27FC236}">
+                      <a16:creationId xmlns:a16="http://schemas.microsoft.com/office/drawing/2014/main" id="{B530DD8F-49E5-4C40-8F35-7E93449F8474}"/>
+                    </a:ext>
+                  </a:extLst>
+                </p14:cNvPr>
+                <p14:cNvContentPartPr/>
+                <p14:nvPr/>
+              </p14:nvContentPartPr>
+              <p14:xfrm>
+                <a:off x="2927073" y="3074114"/>
+                <a:ext cx="126720" cy="41040"/>
+              </p14:xfrm>
+            </p:contentPart>
+          </mc:Choice>
+          <mc:Fallback>
+            <p:pic>
+              <p:nvPicPr>
+                <p:cNvPr id="3" name="Ink 2">
+                  <a:extLst>
+                    <a:ext uri="{FF2B5EF4-FFF2-40B4-BE49-F238E27FC236}">
+                      <a16:creationId xmlns:a16="http://schemas.microsoft.com/office/drawing/2014/main" id="{B530DD8F-49E5-4C40-8F35-7E93449F8474}"/>
+                    </a:ext>
+                  </a:extLst>
+                </p:cNvPr>
+                <p:cNvPicPr/>
+                <p:nvPr/>
+              </p:nvPicPr>
+              <p:blipFill>
+                <a:blip r:embed="rId4"/>
+                <a:stretch>
+                  <a:fillRect/>
+                </a:stretch>
+              </p:blipFill>
+              <p:spPr>
+                <a:xfrm>
+                  <a:off x="2918433" y="3065114"/>
+                  <a:ext cx="144360" cy="58680"/>
+                </a:xfrm>
+                <a:prstGeom prst="rect">
+                  <a:avLst/>
+                </a:prstGeom>
+              </p:spPr>
+            </p:pic>
+          </mc:Fallback>
+        </mc:AlternateContent>
+        <mc:AlternateContent xmlns:mc="http://schemas.openxmlformats.org/markup-compatibility/2006">
+          <mc:Choice xmlns:p14="http://schemas.microsoft.com/office/powerpoint/2010/main" Requires="p14">
+            <p:contentPart p14:bwMode="auto" r:id="rId5">
+              <p14:nvContentPartPr>
+                <p14:cNvPr id="5" name="Ink 4">
+                  <a:extLst>
+                    <a:ext uri="{FF2B5EF4-FFF2-40B4-BE49-F238E27FC236}">
+                      <a16:creationId xmlns:a16="http://schemas.microsoft.com/office/drawing/2014/main" id="{EAE763B9-1D77-49DF-8793-A47D3CEE7DF2}"/>
+                    </a:ext>
+                  </a:extLst>
+                </p14:cNvPr>
+                <p14:cNvContentPartPr/>
+                <p14:nvPr/>
+              </p14:nvContentPartPr>
+              <p14:xfrm>
+                <a:off x="2923833" y="3019754"/>
+                <a:ext cx="8280" cy="70560"/>
+              </p14:xfrm>
+            </p:contentPart>
+          </mc:Choice>
+          <mc:Fallback>
+            <p:pic>
+              <p:nvPicPr>
+                <p:cNvPr id="5" name="Ink 4">
+                  <a:extLst>
+                    <a:ext uri="{FF2B5EF4-FFF2-40B4-BE49-F238E27FC236}">
+                      <a16:creationId xmlns:a16="http://schemas.microsoft.com/office/drawing/2014/main" id="{EAE763B9-1D77-49DF-8793-A47D3CEE7DF2}"/>
+                    </a:ext>
+                  </a:extLst>
+                </p:cNvPr>
+                <p:cNvPicPr/>
+                <p:nvPr/>
+              </p:nvPicPr>
+              <p:blipFill>
+                <a:blip r:embed="rId6"/>
+                <a:stretch>
+                  <a:fillRect/>
+                </a:stretch>
+              </p:blipFill>
+              <p:spPr>
+                <a:xfrm>
+                  <a:off x="2915193" y="3010754"/>
+                  <a:ext cx="25920" cy="88200"/>
+                </a:xfrm>
+                <a:prstGeom prst="rect">
+                  <a:avLst/>
+                </a:prstGeom>
+              </p:spPr>
+            </p:pic>
+          </mc:Fallback>
+        </mc:AlternateContent>
+        <mc:AlternateContent xmlns:mc="http://schemas.openxmlformats.org/markup-compatibility/2006">
+          <mc:Choice xmlns:p14="http://schemas.microsoft.com/office/powerpoint/2010/main" Requires="p14">
+            <p:contentPart p14:bwMode="auto" r:id="rId7">
+              <p14:nvContentPartPr>
+                <p14:cNvPr id="6" name="Ink 5">
+                  <a:extLst>
+                    <a:ext uri="{FF2B5EF4-FFF2-40B4-BE49-F238E27FC236}">
+                      <a16:creationId xmlns:a16="http://schemas.microsoft.com/office/drawing/2014/main" id="{54576DEC-2A29-4736-92A6-4C28EEF09BA4}"/>
+                    </a:ext>
+                  </a:extLst>
+                </p14:cNvPr>
+                <p14:cNvContentPartPr/>
+                <p14:nvPr/>
+              </p14:nvContentPartPr>
+              <p14:xfrm>
+                <a:off x="2940033" y="2791874"/>
+                <a:ext cx="922680" cy="274680"/>
+              </p14:xfrm>
+            </p:contentPart>
+          </mc:Choice>
+          <mc:Fallback>
+            <p:pic>
+              <p:nvPicPr>
+                <p:cNvPr id="6" name="Ink 5">
+                  <a:extLst>
+                    <a:ext uri="{FF2B5EF4-FFF2-40B4-BE49-F238E27FC236}">
+                      <a16:creationId xmlns:a16="http://schemas.microsoft.com/office/drawing/2014/main" id="{54576DEC-2A29-4736-92A6-4C28EEF09BA4}"/>
+                    </a:ext>
+                  </a:extLst>
+                </p:cNvPr>
+                <p:cNvPicPr/>
+                <p:nvPr/>
+              </p:nvPicPr>
+              <p:blipFill>
+                <a:blip r:embed="rId8"/>
+                <a:stretch>
+                  <a:fillRect/>
+                </a:stretch>
+              </p:blipFill>
+              <p:spPr>
+                <a:xfrm>
+                  <a:off x="2931393" y="2782874"/>
+                  <a:ext cx="940320" cy="292320"/>
+                </a:xfrm>
+                <a:prstGeom prst="rect">
+                  <a:avLst/>
+                </a:prstGeom>
+              </p:spPr>
+            </p:pic>
+          </mc:Fallback>
+        </mc:AlternateContent>
+        <mc:AlternateContent xmlns:mc="http://schemas.openxmlformats.org/markup-compatibility/2006">
+          <mc:Choice xmlns:p14="http://schemas.microsoft.com/office/powerpoint/2010/main" Requires="p14">
+            <p:contentPart p14:bwMode="auto" r:id="rId9">
+              <p14:nvContentPartPr>
+                <p14:cNvPr id="8" name="Ink 7">
+                  <a:extLst>
+                    <a:ext uri="{FF2B5EF4-FFF2-40B4-BE49-F238E27FC236}">
+                      <a16:creationId xmlns:a16="http://schemas.microsoft.com/office/drawing/2014/main" id="{83562A4A-D36C-491F-B62C-A885162BBE61}"/>
+                    </a:ext>
+                  </a:extLst>
+                </p14:cNvPr>
+                <p14:cNvContentPartPr/>
+                <p14:nvPr/>
+              </p14:nvContentPartPr>
+              <p14:xfrm>
+                <a:off x="3913473" y="2719154"/>
+                <a:ext cx="130320" cy="141120"/>
+              </p14:xfrm>
+            </p:contentPart>
+          </mc:Choice>
+          <mc:Fallback>
+            <p:pic>
+              <p:nvPicPr>
+                <p:cNvPr id="8" name="Ink 7">
+                  <a:extLst>
+                    <a:ext uri="{FF2B5EF4-FFF2-40B4-BE49-F238E27FC236}">
+                      <a16:creationId xmlns:a16="http://schemas.microsoft.com/office/drawing/2014/main" id="{83562A4A-D36C-491F-B62C-A885162BBE61}"/>
+                    </a:ext>
+                  </a:extLst>
+                </p:cNvPr>
+                <p:cNvPicPr/>
+                <p:nvPr/>
+              </p:nvPicPr>
+              <p:blipFill>
+                <a:blip r:embed="rId10"/>
+                <a:stretch>
+                  <a:fillRect/>
+                </a:stretch>
+              </p:blipFill>
+              <p:spPr>
+                <a:xfrm>
+                  <a:off x="3904473" y="2710514"/>
+                  <a:ext cx="147960" cy="158760"/>
+                </a:xfrm>
+                <a:prstGeom prst="rect">
+                  <a:avLst/>
+                </a:prstGeom>
+              </p:spPr>
+            </p:pic>
+          </mc:Fallback>
+        </mc:AlternateContent>
+        <mc:AlternateContent xmlns:mc="http://schemas.openxmlformats.org/markup-compatibility/2006">
+          <mc:Choice xmlns:p14="http://schemas.microsoft.com/office/powerpoint/2010/main" Requires="p14">
+            <p:contentPart p14:bwMode="auto" r:id="rId11">
+              <p14:nvContentPartPr>
+                <p14:cNvPr id="9" name="Ink 8">
+                  <a:extLst>
+                    <a:ext uri="{FF2B5EF4-FFF2-40B4-BE49-F238E27FC236}">
+                      <a16:creationId xmlns:a16="http://schemas.microsoft.com/office/drawing/2014/main" id="{16657183-05BF-44B2-9472-4FBDD4C65768}"/>
+                    </a:ext>
+                  </a:extLst>
+                </p14:cNvPr>
+                <p14:cNvContentPartPr/>
+                <p14:nvPr/>
+              </p14:nvContentPartPr>
+              <p14:xfrm>
+                <a:off x="4071513" y="2740754"/>
+                <a:ext cx="160560" cy="112680"/>
+              </p14:xfrm>
+            </p:contentPart>
+          </mc:Choice>
+          <mc:Fallback>
+            <p:pic>
+              <p:nvPicPr>
+                <p:cNvPr id="9" name="Ink 8">
+                  <a:extLst>
+                    <a:ext uri="{FF2B5EF4-FFF2-40B4-BE49-F238E27FC236}">
+                      <a16:creationId xmlns:a16="http://schemas.microsoft.com/office/drawing/2014/main" id="{16657183-05BF-44B2-9472-4FBDD4C65768}"/>
+                    </a:ext>
+                  </a:extLst>
+                </p:cNvPr>
+                <p:cNvPicPr/>
+                <p:nvPr/>
+              </p:nvPicPr>
+              <p:blipFill>
+                <a:blip r:embed="rId12"/>
+                <a:stretch>
+                  <a:fillRect/>
+                </a:stretch>
+              </p:blipFill>
+              <p:spPr>
+                <a:xfrm>
+                  <a:off x="4062513" y="2732114"/>
+                  <a:ext cx="178200" cy="130320"/>
+                </a:xfrm>
+                <a:prstGeom prst="rect">
+                  <a:avLst/>
+                </a:prstGeom>
+              </p:spPr>
+            </p:pic>
+          </mc:Fallback>
+        </mc:AlternateContent>
+        <mc:AlternateContent xmlns:mc="http://schemas.openxmlformats.org/markup-compatibility/2006">
+          <mc:Choice xmlns:p14="http://schemas.microsoft.com/office/powerpoint/2010/main" Requires="p14">
+            <p:contentPart p14:bwMode="auto" r:id="rId13">
+              <p14:nvContentPartPr>
+                <p14:cNvPr id="10" name="Ink 9">
+                  <a:extLst>
+                    <a:ext uri="{FF2B5EF4-FFF2-40B4-BE49-F238E27FC236}">
+                      <a16:creationId xmlns:a16="http://schemas.microsoft.com/office/drawing/2014/main" id="{81913A3B-7C75-4E5E-9DE1-FC1C0E03C197}"/>
+                    </a:ext>
+                  </a:extLst>
+                </p14:cNvPr>
+                <p14:cNvContentPartPr/>
+                <p14:nvPr/>
+              </p14:nvContentPartPr>
+              <p14:xfrm>
+                <a:off x="4256193" y="2707634"/>
+                <a:ext cx="127800" cy="111240"/>
+              </p14:xfrm>
+            </p:contentPart>
+          </mc:Choice>
+          <mc:Fallback>
+            <p:pic>
+              <p:nvPicPr>
+                <p:cNvPr id="10" name="Ink 9">
+                  <a:extLst>
+                    <a:ext uri="{FF2B5EF4-FFF2-40B4-BE49-F238E27FC236}">
+                      <a16:creationId xmlns:a16="http://schemas.microsoft.com/office/drawing/2014/main" id="{81913A3B-7C75-4E5E-9DE1-FC1C0E03C197}"/>
+                    </a:ext>
+                  </a:extLst>
+                </p:cNvPr>
+                <p:cNvPicPr/>
+                <p:nvPr/>
+              </p:nvPicPr>
+              <p:blipFill>
+                <a:blip r:embed="rId14"/>
+                <a:stretch>
+                  <a:fillRect/>
+                </a:stretch>
+              </p:blipFill>
+              <p:spPr>
+                <a:xfrm>
+                  <a:off x="4247553" y="2698634"/>
+                  <a:ext cx="145440" cy="128880"/>
+                </a:xfrm>
+                <a:prstGeom prst="rect">
+                  <a:avLst/>
+                </a:prstGeom>
+              </p:spPr>
+            </p:pic>
+          </mc:Fallback>
+        </mc:AlternateContent>
+      </p:grpSp>
+      <p:grpSp>
+        <p:nvGrpSpPr>
+          <p:cNvPr id="16" name="Group 15">
+            <a:extLst>
+              <a:ext uri="{FF2B5EF4-FFF2-40B4-BE49-F238E27FC236}">
+                <a16:creationId xmlns:a16="http://schemas.microsoft.com/office/drawing/2014/main" id="{47B4D808-A5AD-4019-A0F0-92586BD19E23}"/>
+              </a:ext>
+            </a:extLst>
+          </p:cNvPr>
+          <p:cNvGrpSpPr/>
+          <p:nvPr/>
+        </p:nvGrpSpPr>
+        <p:grpSpPr>
+          <a:xfrm>
+            <a:off x="4649313" y="2506394"/>
+            <a:ext cx="387360" cy="314280"/>
+            <a:chOff x="4649313" y="2506394"/>
+            <a:chExt cx="387360" cy="314280"/>
+          </a:xfrm>
+        </p:grpSpPr>
+        <mc:AlternateContent xmlns:mc="http://schemas.openxmlformats.org/markup-compatibility/2006">
+          <mc:Choice xmlns:p14="http://schemas.microsoft.com/office/powerpoint/2010/main" Requires="p14">
+            <p:contentPart p14:bwMode="auto" r:id="rId15">
+              <p14:nvContentPartPr>
+                <p14:cNvPr id="11" name="Ink 10">
+                  <a:extLst>
+                    <a:ext uri="{FF2B5EF4-FFF2-40B4-BE49-F238E27FC236}">
+                      <a16:creationId xmlns:a16="http://schemas.microsoft.com/office/drawing/2014/main" id="{DCCDCF94-4839-46A3-8806-8AFB93853049}"/>
+                    </a:ext>
+                  </a:extLst>
+                </p14:cNvPr>
+                <p14:cNvContentPartPr/>
+                <p14:nvPr/>
+              </p14:nvContentPartPr>
+              <p14:xfrm>
+                <a:off x="4649313" y="2648234"/>
+                <a:ext cx="66960" cy="172440"/>
+              </p14:xfrm>
+            </p:contentPart>
+          </mc:Choice>
+          <mc:Fallback>
+            <p:pic>
+              <p:nvPicPr>
+                <p:cNvPr id="11" name="Ink 10">
+                  <a:extLst>
+                    <a:ext uri="{FF2B5EF4-FFF2-40B4-BE49-F238E27FC236}">
+                      <a16:creationId xmlns:a16="http://schemas.microsoft.com/office/drawing/2014/main" id="{DCCDCF94-4839-46A3-8806-8AFB93853049}"/>
+                    </a:ext>
+                  </a:extLst>
+                </p:cNvPr>
+                <p:cNvPicPr/>
+                <p:nvPr/>
+              </p:nvPicPr>
+              <p:blipFill>
+                <a:blip r:embed="rId16"/>
+                <a:stretch>
+                  <a:fillRect/>
+                </a:stretch>
+              </p:blipFill>
+              <p:spPr>
+                <a:xfrm>
+                  <a:off x="4640673" y="2639234"/>
+                  <a:ext cx="84600" cy="190080"/>
+                </a:xfrm>
+                <a:prstGeom prst="rect">
+                  <a:avLst/>
+                </a:prstGeom>
+              </p:spPr>
+            </p:pic>
+          </mc:Fallback>
+        </mc:AlternateContent>
+        <mc:AlternateContent xmlns:mc="http://schemas.openxmlformats.org/markup-compatibility/2006">
+          <mc:Choice xmlns:p14="http://schemas.microsoft.com/office/powerpoint/2010/main" Requires="p14">
+            <p:contentPart p14:bwMode="auto" r:id="rId17">
+              <p14:nvContentPartPr>
+                <p14:cNvPr id="13" name="Ink 12">
+                  <a:extLst>
+                    <a:ext uri="{FF2B5EF4-FFF2-40B4-BE49-F238E27FC236}">
+                      <a16:creationId xmlns:a16="http://schemas.microsoft.com/office/drawing/2014/main" id="{6F1BCC9B-43E8-4645-8A79-57E8495D24E1}"/>
+                    </a:ext>
+                  </a:extLst>
+                </p14:cNvPr>
+                <p14:cNvContentPartPr/>
+                <p14:nvPr/>
+              </p14:nvContentPartPr>
+              <p14:xfrm>
+                <a:off x="4751193" y="2616914"/>
+                <a:ext cx="115560" cy="113760"/>
+              </p14:xfrm>
+            </p:contentPart>
+          </mc:Choice>
+          <mc:Fallback>
+            <p:pic>
+              <p:nvPicPr>
+                <p:cNvPr id="13" name="Ink 12">
+                  <a:extLst>
+                    <a:ext uri="{FF2B5EF4-FFF2-40B4-BE49-F238E27FC236}">
+                      <a16:creationId xmlns:a16="http://schemas.microsoft.com/office/drawing/2014/main" id="{6F1BCC9B-43E8-4645-8A79-57E8495D24E1}"/>
+                    </a:ext>
+                  </a:extLst>
+                </p:cNvPr>
+                <p:cNvPicPr/>
+                <p:nvPr/>
+              </p:nvPicPr>
+              <p:blipFill>
+                <a:blip r:embed="rId18"/>
+                <a:stretch>
+                  <a:fillRect/>
+                </a:stretch>
+              </p:blipFill>
+              <p:spPr>
+                <a:xfrm>
+                  <a:off x="4742193" y="2607914"/>
+                  <a:ext cx="133200" cy="131400"/>
+                </a:xfrm>
+                <a:prstGeom prst="rect">
+                  <a:avLst/>
+                </a:prstGeom>
+              </p:spPr>
+            </p:pic>
+          </mc:Fallback>
+        </mc:AlternateContent>
+        <mc:AlternateContent xmlns:mc="http://schemas.openxmlformats.org/markup-compatibility/2006">
+          <mc:Choice xmlns:p14="http://schemas.microsoft.com/office/powerpoint/2010/main" Requires="p14">
+            <p:contentPart p14:bwMode="auto" r:id="rId19">
+              <p14:nvContentPartPr>
+                <p14:cNvPr id="14" name="Ink 13">
+                  <a:extLst>
+                    <a:ext uri="{FF2B5EF4-FFF2-40B4-BE49-F238E27FC236}">
+                      <a16:creationId xmlns:a16="http://schemas.microsoft.com/office/drawing/2014/main" id="{DD8B3D36-5475-40D9-9CD2-6CA18D8A244A}"/>
+                    </a:ext>
+                  </a:extLst>
+                </p14:cNvPr>
+                <p14:cNvContentPartPr/>
+                <p14:nvPr/>
+              </p14:nvContentPartPr>
+              <p14:xfrm>
+                <a:off x="4975473" y="2506394"/>
+                <a:ext cx="6840" cy="276120"/>
+              </p14:xfrm>
+            </p:contentPart>
+          </mc:Choice>
+          <mc:Fallback>
+            <p:pic>
+              <p:nvPicPr>
+                <p:cNvPr id="14" name="Ink 13">
+                  <a:extLst>
+                    <a:ext uri="{FF2B5EF4-FFF2-40B4-BE49-F238E27FC236}">
+                      <a16:creationId xmlns:a16="http://schemas.microsoft.com/office/drawing/2014/main" id="{DD8B3D36-5475-40D9-9CD2-6CA18D8A244A}"/>
+                    </a:ext>
+                  </a:extLst>
+                </p:cNvPr>
+                <p:cNvPicPr/>
+                <p:nvPr/>
+              </p:nvPicPr>
+              <p:blipFill>
+                <a:blip r:embed="rId20"/>
+                <a:stretch>
+                  <a:fillRect/>
+                </a:stretch>
+              </p:blipFill>
+              <p:spPr>
+                <a:xfrm>
+                  <a:off x="4966473" y="2497754"/>
+                  <a:ext cx="24480" cy="293760"/>
+                </a:xfrm>
+                <a:prstGeom prst="rect">
+                  <a:avLst/>
+                </a:prstGeom>
+              </p:spPr>
+            </p:pic>
+          </mc:Fallback>
+        </mc:AlternateContent>
+        <mc:AlternateContent xmlns:mc="http://schemas.openxmlformats.org/markup-compatibility/2006">
+          <mc:Choice xmlns:p14="http://schemas.microsoft.com/office/powerpoint/2010/main" Requires="p14">
+            <p:contentPart p14:bwMode="auto" r:id="rId21">
+              <p14:nvContentPartPr>
+                <p14:cNvPr id="15" name="Ink 14">
+                  <a:extLst>
+                    <a:ext uri="{FF2B5EF4-FFF2-40B4-BE49-F238E27FC236}">
+                      <a16:creationId xmlns:a16="http://schemas.microsoft.com/office/drawing/2014/main" id="{6B39F19F-62AE-4A15-AE56-B4F25590CF39}"/>
+                    </a:ext>
+                  </a:extLst>
+                </p14:cNvPr>
+                <p14:cNvContentPartPr/>
+                <p14:nvPr/>
+              </p14:nvContentPartPr>
+              <p14:xfrm>
+                <a:off x="4910673" y="2608994"/>
+                <a:ext cx="126000" cy="360"/>
+              </p14:xfrm>
+            </p:contentPart>
+          </mc:Choice>
+          <mc:Fallback>
+            <p:pic>
+              <p:nvPicPr>
+                <p:cNvPr id="15" name="Ink 14">
+                  <a:extLst>
+                    <a:ext uri="{FF2B5EF4-FFF2-40B4-BE49-F238E27FC236}">
+                      <a16:creationId xmlns:a16="http://schemas.microsoft.com/office/drawing/2014/main" id="{6B39F19F-62AE-4A15-AE56-B4F25590CF39}"/>
+                    </a:ext>
+                  </a:extLst>
+                </p:cNvPr>
+                <p:cNvPicPr/>
+                <p:nvPr/>
+              </p:nvPicPr>
+              <p:blipFill>
+                <a:blip r:embed="rId22"/>
+                <a:stretch>
+                  <a:fillRect/>
+                </a:stretch>
+              </p:blipFill>
+              <p:spPr>
+                <a:xfrm>
+                  <a:off x="4901673" y="2599994"/>
+                  <a:ext cx="143640" cy="18000"/>
+                </a:xfrm>
+                <a:prstGeom prst="rect">
+                  <a:avLst/>
+                </a:prstGeom>
+              </p:spPr>
+            </p:pic>
+          </mc:Fallback>
+        </mc:AlternateContent>
+      </p:grpSp>
+      <p:grpSp>
+        <p:nvGrpSpPr>
+          <p:cNvPr id="34" name="Group 33">
+            <a:extLst>
+              <a:ext uri="{FF2B5EF4-FFF2-40B4-BE49-F238E27FC236}">
+                <a16:creationId xmlns:a16="http://schemas.microsoft.com/office/drawing/2014/main" id="{E22D1EFB-9FD6-4859-8A4E-07110DAF3CF0}"/>
+              </a:ext>
+            </a:extLst>
+          </p:cNvPr>
+          <p:cNvGrpSpPr/>
+          <p:nvPr/>
+        </p:nvGrpSpPr>
+        <p:grpSpPr>
+          <a:xfrm>
+            <a:off x="5303433" y="2128034"/>
+            <a:ext cx="1721520" cy="557640"/>
+            <a:chOff x="5303433" y="2128034"/>
+            <a:chExt cx="1721520" cy="557640"/>
+          </a:xfrm>
+        </p:grpSpPr>
+        <mc:AlternateContent xmlns:mc="http://schemas.openxmlformats.org/markup-compatibility/2006">
+          <mc:Choice xmlns:p14="http://schemas.microsoft.com/office/powerpoint/2010/main" Requires="p14">
+            <p:contentPart p14:bwMode="auto" r:id="rId23">
+              <p14:nvContentPartPr>
+                <p14:cNvPr id="17" name="Ink 16">
+                  <a:extLst>
+                    <a:ext uri="{FF2B5EF4-FFF2-40B4-BE49-F238E27FC236}">
+                      <a16:creationId xmlns:a16="http://schemas.microsoft.com/office/drawing/2014/main" id="{1720F025-8495-4E0A-ACC6-7A93414915F3}"/>
+                    </a:ext>
+                  </a:extLst>
+                </p14:cNvPr>
+                <p14:cNvContentPartPr/>
+                <p14:nvPr/>
+              </p14:nvContentPartPr>
+              <p14:xfrm>
+                <a:off x="5303433" y="2520794"/>
+                <a:ext cx="119520" cy="105840"/>
+              </p14:xfrm>
+            </p:contentPart>
+          </mc:Choice>
+          <mc:Fallback>
+            <p:pic>
+              <p:nvPicPr>
+                <p:cNvPr id="17" name="Ink 16">
+                  <a:extLst>
+                    <a:ext uri="{FF2B5EF4-FFF2-40B4-BE49-F238E27FC236}">
+                      <a16:creationId xmlns:a16="http://schemas.microsoft.com/office/drawing/2014/main" id="{1720F025-8495-4E0A-ACC6-7A93414915F3}"/>
+                    </a:ext>
+                  </a:extLst>
+                </p:cNvPr>
+                <p:cNvPicPr/>
+                <p:nvPr/>
+              </p:nvPicPr>
+              <p:blipFill>
+                <a:blip r:embed="rId24"/>
+                <a:stretch>
+                  <a:fillRect/>
+                </a:stretch>
+              </p:blipFill>
+              <p:spPr>
+                <a:xfrm>
+                  <a:off x="5294793" y="2511794"/>
+                  <a:ext cx="137160" cy="123480"/>
+                </a:xfrm>
+                <a:prstGeom prst="rect">
+                  <a:avLst/>
+                </a:prstGeom>
+              </p:spPr>
+            </p:pic>
+          </mc:Fallback>
+        </mc:AlternateContent>
+        <mc:AlternateContent xmlns:mc="http://schemas.openxmlformats.org/markup-compatibility/2006">
+          <mc:Choice xmlns:p14="http://schemas.microsoft.com/office/powerpoint/2010/main" Requires="p14">
+            <p:contentPart p14:bwMode="auto" r:id="rId25">
+              <p14:nvContentPartPr>
+                <p14:cNvPr id="18" name="Ink 17">
+                  <a:extLst>
+                    <a:ext uri="{FF2B5EF4-FFF2-40B4-BE49-F238E27FC236}">
+                      <a16:creationId xmlns:a16="http://schemas.microsoft.com/office/drawing/2014/main" id="{DC556A33-4980-4BA8-9519-2AAC883386AA}"/>
+                    </a:ext>
+                  </a:extLst>
+                </p14:cNvPr>
+                <p14:cNvContentPartPr/>
+                <p14:nvPr/>
+              </p14:nvContentPartPr>
+              <p14:xfrm>
+                <a:off x="5473713" y="2488394"/>
+                <a:ext cx="99000" cy="197280"/>
+              </p14:xfrm>
+            </p:contentPart>
+          </mc:Choice>
+          <mc:Fallback>
+            <p:pic>
+              <p:nvPicPr>
+                <p:cNvPr id="18" name="Ink 17">
+                  <a:extLst>
+                    <a:ext uri="{FF2B5EF4-FFF2-40B4-BE49-F238E27FC236}">
+                      <a16:creationId xmlns:a16="http://schemas.microsoft.com/office/drawing/2014/main" id="{DC556A33-4980-4BA8-9519-2AAC883386AA}"/>
+                    </a:ext>
+                  </a:extLst>
+                </p:cNvPr>
+                <p:cNvPicPr/>
+                <p:nvPr/>
+              </p:nvPicPr>
+              <p:blipFill>
+                <a:blip r:embed="rId26"/>
+                <a:stretch>
+                  <a:fillRect/>
+                </a:stretch>
+              </p:blipFill>
+              <p:spPr>
+                <a:xfrm>
+                  <a:off x="5465073" y="2479754"/>
+                  <a:ext cx="116640" cy="214920"/>
+                </a:xfrm>
+                <a:prstGeom prst="rect">
+                  <a:avLst/>
+                </a:prstGeom>
+              </p:spPr>
+            </p:pic>
+          </mc:Fallback>
+        </mc:AlternateContent>
+        <mc:AlternateContent xmlns:mc="http://schemas.openxmlformats.org/markup-compatibility/2006">
+          <mc:Choice xmlns:p14="http://schemas.microsoft.com/office/powerpoint/2010/main" Requires="p14">
+            <p:contentPart p14:bwMode="auto" r:id="rId27">
+              <p14:nvContentPartPr>
+                <p14:cNvPr id="19" name="Ink 18">
+                  <a:extLst>
+                    <a:ext uri="{FF2B5EF4-FFF2-40B4-BE49-F238E27FC236}">
+                      <a16:creationId xmlns:a16="http://schemas.microsoft.com/office/drawing/2014/main" id="{B2DAE158-82A9-4785-9B19-D96994B6C8B1}"/>
+                    </a:ext>
+                  </a:extLst>
+                </p14:cNvPr>
+                <p14:cNvContentPartPr/>
+                <p14:nvPr/>
+              </p14:nvContentPartPr>
+              <p14:xfrm>
+                <a:off x="5596473" y="2440154"/>
+                <a:ext cx="283320" cy="146880"/>
+              </p14:xfrm>
+            </p:contentPart>
+          </mc:Choice>
+          <mc:Fallback>
+            <p:pic>
+              <p:nvPicPr>
+                <p:cNvPr id="19" name="Ink 18">
+                  <a:extLst>
+                    <a:ext uri="{FF2B5EF4-FFF2-40B4-BE49-F238E27FC236}">
+                      <a16:creationId xmlns:a16="http://schemas.microsoft.com/office/drawing/2014/main" id="{B2DAE158-82A9-4785-9B19-D96994B6C8B1}"/>
+                    </a:ext>
+                  </a:extLst>
+                </p:cNvPr>
+                <p:cNvPicPr/>
+                <p:nvPr/>
+              </p:nvPicPr>
+              <p:blipFill>
+                <a:blip r:embed="rId28"/>
+                <a:stretch>
+                  <a:fillRect/>
+                </a:stretch>
+              </p:blipFill>
+              <p:spPr>
+                <a:xfrm>
+                  <a:off x="5587473" y="2431154"/>
+                  <a:ext cx="300960" cy="164520"/>
+                </a:xfrm>
+                <a:prstGeom prst="rect">
+                  <a:avLst/>
+                </a:prstGeom>
+              </p:spPr>
+            </p:pic>
+          </mc:Fallback>
+        </mc:AlternateContent>
+        <mc:AlternateContent xmlns:mc="http://schemas.openxmlformats.org/markup-compatibility/2006">
+          <mc:Choice xmlns:p14="http://schemas.microsoft.com/office/powerpoint/2010/main" Requires="p14">
+            <p:contentPart p14:bwMode="auto" r:id="rId29">
+              <p14:nvContentPartPr>
+                <p14:cNvPr id="20" name="Ink 19">
+                  <a:extLst>
+                    <a:ext uri="{FF2B5EF4-FFF2-40B4-BE49-F238E27FC236}">
+                      <a16:creationId xmlns:a16="http://schemas.microsoft.com/office/drawing/2014/main" id="{BDDFE704-B751-4D72-A944-8460B42F09B5}"/>
+                    </a:ext>
+                  </a:extLst>
+                </p14:cNvPr>
+                <p14:cNvContentPartPr/>
+                <p14:nvPr/>
+              </p14:nvContentPartPr>
+              <p14:xfrm>
+                <a:off x="6059433" y="2412434"/>
+                <a:ext cx="207000" cy="119160"/>
+              </p14:xfrm>
+            </p:contentPart>
+          </mc:Choice>
+          <mc:Fallback>
+            <p:pic>
+              <p:nvPicPr>
+                <p:cNvPr id="20" name="Ink 19">
+                  <a:extLst>
+                    <a:ext uri="{FF2B5EF4-FFF2-40B4-BE49-F238E27FC236}">
+                      <a16:creationId xmlns:a16="http://schemas.microsoft.com/office/drawing/2014/main" id="{BDDFE704-B751-4D72-A944-8460B42F09B5}"/>
+                    </a:ext>
+                  </a:extLst>
+                </p:cNvPr>
+                <p:cNvPicPr/>
+                <p:nvPr/>
+              </p:nvPicPr>
+              <p:blipFill>
+                <a:blip r:embed="rId30"/>
+                <a:stretch>
+                  <a:fillRect/>
+                </a:stretch>
+              </p:blipFill>
+              <p:spPr>
+                <a:xfrm>
+                  <a:off x="6050433" y="2403794"/>
+                  <a:ext cx="224640" cy="136800"/>
+                </a:xfrm>
+                <a:prstGeom prst="rect">
+                  <a:avLst/>
+                </a:prstGeom>
+              </p:spPr>
+            </p:pic>
+          </mc:Fallback>
+        </mc:AlternateContent>
+        <mc:AlternateContent xmlns:mc="http://schemas.openxmlformats.org/markup-compatibility/2006">
+          <mc:Choice xmlns:p14="http://schemas.microsoft.com/office/powerpoint/2010/main" Requires="p14">
+            <p:contentPart p14:bwMode="auto" r:id="rId31">
+              <p14:nvContentPartPr>
+                <p14:cNvPr id="21" name="Ink 20">
+                  <a:extLst>
+                    <a:ext uri="{FF2B5EF4-FFF2-40B4-BE49-F238E27FC236}">
+                      <a16:creationId xmlns:a16="http://schemas.microsoft.com/office/drawing/2014/main" id="{E466AD9D-6EBE-4FC1-96FF-AC0CD03F2421}"/>
+                    </a:ext>
+                  </a:extLst>
+                </p14:cNvPr>
+                <p14:cNvContentPartPr/>
+                <p14:nvPr/>
+              </p14:nvContentPartPr>
+              <p14:xfrm>
+                <a:off x="6394233" y="2317394"/>
+                <a:ext cx="158760" cy="176400"/>
+              </p14:xfrm>
+            </p:contentPart>
+          </mc:Choice>
+          <mc:Fallback>
+            <p:pic>
+              <p:nvPicPr>
+                <p:cNvPr id="21" name="Ink 20">
+                  <a:extLst>
+                    <a:ext uri="{FF2B5EF4-FFF2-40B4-BE49-F238E27FC236}">
+                      <a16:creationId xmlns:a16="http://schemas.microsoft.com/office/drawing/2014/main" id="{E466AD9D-6EBE-4FC1-96FF-AC0CD03F2421}"/>
+                    </a:ext>
+                  </a:extLst>
+                </p:cNvPr>
+                <p:cNvPicPr/>
+                <p:nvPr/>
+              </p:nvPicPr>
+              <p:blipFill>
+                <a:blip r:embed="rId32"/>
+                <a:stretch>
+                  <a:fillRect/>
+                </a:stretch>
+              </p:blipFill>
+              <p:spPr>
+                <a:xfrm>
+                  <a:off x="6385593" y="2308394"/>
+                  <a:ext cx="176400" cy="194040"/>
+                </a:xfrm>
+                <a:prstGeom prst="rect">
+                  <a:avLst/>
+                </a:prstGeom>
+              </p:spPr>
+            </p:pic>
+          </mc:Fallback>
+        </mc:AlternateContent>
+        <mc:AlternateContent xmlns:mc="http://schemas.openxmlformats.org/markup-compatibility/2006">
+          <mc:Choice xmlns:p14="http://schemas.microsoft.com/office/powerpoint/2010/main" Requires="p14">
+            <p:contentPart p14:bwMode="auto" r:id="rId33">
+              <p14:nvContentPartPr>
+                <p14:cNvPr id="22" name="Ink 21">
+                  <a:extLst>
+                    <a:ext uri="{FF2B5EF4-FFF2-40B4-BE49-F238E27FC236}">
+                      <a16:creationId xmlns:a16="http://schemas.microsoft.com/office/drawing/2014/main" id="{464EF750-89E2-49AB-9017-D4E4FD5E11F9}"/>
+                    </a:ext>
+                  </a:extLst>
+                </p14:cNvPr>
+                <p14:cNvContentPartPr/>
+                <p14:nvPr/>
+              </p14:nvContentPartPr>
+              <p14:xfrm>
+                <a:off x="6471633" y="2213714"/>
+                <a:ext cx="82800" cy="119520"/>
+              </p14:xfrm>
+            </p:contentPart>
+          </mc:Choice>
+          <mc:Fallback>
+            <p:pic>
+              <p:nvPicPr>
+                <p:cNvPr id="22" name="Ink 21">
+                  <a:extLst>
+                    <a:ext uri="{FF2B5EF4-FFF2-40B4-BE49-F238E27FC236}">
+                      <a16:creationId xmlns:a16="http://schemas.microsoft.com/office/drawing/2014/main" id="{464EF750-89E2-49AB-9017-D4E4FD5E11F9}"/>
+                    </a:ext>
+                  </a:extLst>
+                </p:cNvPr>
+                <p:cNvPicPr/>
+                <p:nvPr/>
+              </p:nvPicPr>
+              <p:blipFill>
+                <a:blip r:embed="rId34"/>
+                <a:stretch>
+                  <a:fillRect/>
+                </a:stretch>
+              </p:blipFill>
+              <p:spPr>
+                <a:xfrm>
+                  <a:off x="6462993" y="2205074"/>
+                  <a:ext cx="100440" cy="137160"/>
+                </a:xfrm>
+                <a:prstGeom prst="rect">
+                  <a:avLst/>
+                </a:prstGeom>
+              </p:spPr>
+            </p:pic>
+          </mc:Fallback>
+        </mc:AlternateContent>
+        <mc:AlternateContent xmlns:mc="http://schemas.openxmlformats.org/markup-compatibility/2006">
+          <mc:Choice xmlns:p14="http://schemas.microsoft.com/office/powerpoint/2010/main" Requires="p14">
+            <p:contentPart p14:bwMode="auto" r:id="rId35">
+              <p14:nvContentPartPr>
+                <p14:cNvPr id="23" name="Ink 22">
+                  <a:extLst>
+                    <a:ext uri="{FF2B5EF4-FFF2-40B4-BE49-F238E27FC236}">
+                      <a16:creationId xmlns:a16="http://schemas.microsoft.com/office/drawing/2014/main" id="{AABE7A61-8F0A-4E86-967E-3C4E3CB90D31}"/>
+                    </a:ext>
+                  </a:extLst>
+                </p14:cNvPr>
+                <p14:cNvContentPartPr/>
+                <p14:nvPr/>
+              </p14:nvContentPartPr>
+              <p14:xfrm>
+                <a:off x="6432033" y="2404154"/>
+                <a:ext cx="1800" cy="360"/>
+              </p14:xfrm>
+            </p:contentPart>
+          </mc:Choice>
+          <mc:Fallback>
+            <p:pic>
+              <p:nvPicPr>
+                <p:cNvPr id="23" name="Ink 22">
+                  <a:extLst>
+                    <a:ext uri="{FF2B5EF4-FFF2-40B4-BE49-F238E27FC236}">
+                      <a16:creationId xmlns:a16="http://schemas.microsoft.com/office/drawing/2014/main" id="{AABE7A61-8F0A-4E86-967E-3C4E3CB90D31}"/>
+                    </a:ext>
+                  </a:extLst>
+                </p:cNvPr>
+                <p:cNvPicPr/>
+                <p:nvPr/>
+              </p:nvPicPr>
+              <p:blipFill>
+                <a:blip r:embed="rId36"/>
+                <a:stretch>
+                  <a:fillRect/>
+                </a:stretch>
+              </p:blipFill>
+              <p:spPr>
+                <a:xfrm>
+                  <a:off x="6423393" y="2395154"/>
+                  <a:ext cx="19440" cy="18000"/>
+                </a:xfrm>
+                <a:prstGeom prst="rect">
+                  <a:avLst/>
+                </a:prstGeom>
+              </p:spPr>
+            </p:pic>
+          </mc:Fallback>
+        </mc:AlternateContent>
+        <mc:AlternateContent xmlns:mc="http://schemas.openxmlformats.org/markup-compatibility/2006">
+          <mc:Choice xmlns:p14="http://schemas.microsoft.com/office/powerpoint/2010/main" Requires="p14">
+            <p:contentPart p14:bwMode="auto" r:id="rId37">
+              <p14:nvContentPartPr>
+                <p14:cNvPr id="24" name="Ink 23">
+                  <a:extLst>
+                    <a:ext uri="{FF2B5EF4-FFF2-40B4-BE49-F238E27FC236}">
+                      <a16:creationId xmlns:a16="http://schemas.microsoft.com/office/drawing/2014/main" id="{DA7075A5-7B1B-43C1-8C7A-EAA0FE0F3CA9}"/>
+                    </a:ext>
+                  </a:extLst>
+                </p14:cNvPr>
+                <p14:cNvContentPartPr/>
+                <p14:nvPr/>
+              </p14:nvContentPartPr>
+              <p14:xfrm>
+                <a:off x="6479193" y="2358074"/>
+                <a:ext cx="107640" cy="46080"/>
+              </p14:xfrm>
+            </p:contentPart>
+          </mc:Choice>
+          <mc:Fallback>
+            <p:pic>
+              <p:nvPicPr>
+                <p:cNvPr id="24" name="Ink 23">
+                  <a:extLst>
+                    <a:ext uri="{FF2B5EF4-FFF2-40B4-BE49-F238E27FC236}">
+                      <a16:creationId xmlns:a16="http://schemas.microsoft.com/office/drawing/2014/main" id="{DA7075A5-7B1B-43C1-8C7A-EAA0FE0F3CA9}"/>
+                    </a:ext>
+                  </a:extLst>
+                </p:cNvPr>
+                <p:cNvPicPr/>
+                <p:nvPr/>
+              </p:nvPicPr>
+              <p:blipFill>
+                <a:blip r:embed="rId38"/>
+                <a:stretch>
+                  <a:fillRect/>
+                </a:stretch>
+              </p:blipFill>
+              <p:spPr>
+                <a:xfrm>
+                  <a:off x="6470193" y="2349434"/>
+                  <a:ext cx="125280" cy="63720"/>
+                </a:xfrm>
+                <a:prstGeom prst="rect">
+                  <a:avLst/>
+                </a:prstGeom>
+              </p:spPr>
+            </p:pic>
+          </mc:Fallback>
+        </mc:AlternateContent>
+        <mc:AlternateContent xmlns:mc="http://schemas.openxmlformats.org/markup-compatibility/2006">
+          <mc:Choice xmlns:p14="http://schemas.microsoft.com/office/powerpoint/2010/main" Requires="p14">
+            <p:contentPart p14:bwMode="auto" r:id="rId39">
+              <p14:nvContentPartPr>
+                <p14:cNvPr id="25" name="Ink 24">
+                  <a:extLst>
+                    <a:ext uri="{FF2B5EF4-FFF2-40B4-BE49-F238E27FC236}">
+                      <a16:creationId xmlns:a16="http://schemas.microsoft.com/office/drawing/2014/main" id="{472DA62E-2E67-4F18-97B7-B64E904809BB}"/>
+                    </a:ext>
+                  </a:extLst>
+                </p14:cNvPr>
+                <p14:cNvContentPartPr/>
+                <p14:nvPr/>
+              </p14:nvContentPartPr>
+              <p14:xfrm>
+                <a:off x="6628953" y="2324954"/>
+                <a:ext cx="46080" cy="86400"/>
+              </p14:xfrm>
+            </p:contentPart>
+          </mc:Choice>
+          <mc:Fallback>
+            <p:pic>
+              <p:nvPicPr>
+                <p:cNvPr id="25" name="Ink 24">
+                  <a:extLst>
+                    <a:ext uri="{FF2B5EF4-FFF2-40B4-BE49-F238E27FC236}">
+                      <a16:creationId xmlns:a16="http://schemas.microsoft.com/office/drawing/2014/main" id="{472DA62E-2E67-4F18-97B7-B64E904809BB}"/>
+                    </a:ext>
+                  </a:extLst>
+                </p:cNvPr>
+                <p:cNvPicPr/>
+                <p:nvPr/>
+              </p:nvPicPr>
+              <p:blipFill>
+                <a:blip r:embed="rId40"/>
+                <a:stretch>
+                  <a:fillRect/>
+                </a:stretch>
+              </p:blipFill>
+              <p:spPr>
+                <a:xfrm>
+                  <a:off x="6620313" y="2316314"/>
+                  <a:ext cx="63720" cy="104040"/>
+                </a:xfrm>
+                <a:prstGeom prst="rect">
+                  <a:avLst/>
+                </a:prstGeom>
+              </p:spPr>
+            </p:pic>
+          </mc:Fallback>
+        </mc:AlternateContent>
+        <mc:AlternateContent xmlns:mc="http://schemas.openxmlformats.org/markup-compatibility/2006">
+          <mc:Choice xmlns:p14="http://schemas.microsoft.com/office/powerpoint/2010/main" Requires="p14">
+            <p:contentPart p14:bwMode="auto" r:id="rId41">
+              <p14:nvContentPartPr>
+                <p14:cNvPr id="26" name="Ink 25">
+                  <a:extLst>
+                    <a:ext uri="{FF2B5EF4-FFF2-40B4-BE49-F238E27FC236}">
+                      <a16:creationId xmlns:a16="http://schemas.microsoft.com/office/drawing/2014/main" id="{823797C4-A7A3-4341-8585-A4F48D14B5C7}"/>
+                    </a:ext>
+                  </a:extLst>
+                </p14:cNvPr>
+                <p14:cNvContentPartPr/>
+                <p14:nvPr/>
+              </p14:nvContentPartPr>
+              <p14:xfrm>
+                <a:off x="6605553" y="2230634"/>
+                <a:ext cx="360" cy="360"/>
+              </p14:xfrm>
+            </p:contentPart>
+          </mc:Choice>
+          <mc:Fallback>
+            <p:pic>
+              <p:nvPicPr>
+                <p:cNvPr id="26" name="Ink 25">
+                  <a:extLst>
+                    <a:ext uri="{FF2B5EF4-FFF2-40B4-BE49-F238E27FC236}">
+                      <a16:creationId xmlns:a16="http://schemas.microsoft.com/office/drawing/2014/main" id="{823797C4-A7A3-4341-8585-A4F48D14B5C7}"/>
+                    </a:ext>
+                  </a:extLst>
+                </p:cNvPr>
+                <p:cNvPicPr/>
+                <p:nvPr/>
+              </p:nvPicPr>
+              <p:blipFill>
+                <a:blip r:embed="rId42"/>
+                <a:stretch>
+                  <a:fillRect/>
+                </a:stretch>
+              </p:blipFill>
+              <p:spPr>
+                <a:xfrm>
+                  <a:off x="6596553" y="2221634"/>
+                  <a:ext cx="18000" cy="18000"/>
+                </a:xfrm>
+                <a:prstGeom prst="rect">
+                  <a:avLst/>
+                </a:prstGeom>
+              </p:spPr>
+            </p:pic>
+          </mc:Fallback>
+        </mc:AlternateContent>
+        <mc:AlternateContent xmlns:mc="http://schemas.openxmlformats.org/markup-compatibility/2006">
+          <mc:Choice xmlns:p14="http://schemas.microsoft.com/office/powerpoint/2010/main" Requires="p14">
+            <p:contentPart p14:bwMode="auto" r:id="rId43">
+              <p14:nvContentPartPr>
+                <p14:cNvPr id="27" name="Ink 26">
+                  <a:extLst>
+                    <a:ext uri="{FF2B5EF4-FFF2-40B4-BE49-F238E27FC236}">
+                      <a16:creationId xmlns:a16="http://schemas.microsoft.com/office/drawing/2014/main" id="{A8AACBE8-303F-46E3-8340-A355A884129D}"/>
+                    </a:ext>
+                  </a:extLst>
+                </p14:cNvPr>
+                <p14:cNvContentPartPr/>
+                <p14:nvPr/>
+              </p14:nvContentPartPr>
+              <p14:xfrm>
+                <a:off x="6660633" y="2128034"/>
+                <a:ext cx="104040" cy="253080"/>
+              </p14:xfrm>
+            </p:contentPart>
+          </mc:Choice>
+          <mc:Fallback>
+            <p:pic>
+              <p:nvPicPr>
+                <p:cNvPr id="27" name="Ink 26">
+                  <a:extLst>
+                    <a:ext uri="{FF2B5EF4-FFF2-40B4-BE49-F238E27FC236}">
+                      <a16:creationId xmlns:a16="http://schemas.microsoft.com/office/drawing/2014/main" id="{A8AACBE8-303F-46E3-8340-A355A884129D}"/>
+                    </a:ext>
+                  </a:extLst>
+                </p:cNvPr>
+                <p:cNvPicPr/>
+                <p:nvPr/>
+              </p:nvPicPr>
+              <p:blipFill>
+                <a:blip r:embed="rId44"/>
+                <a:stretch>
+                  <a:fillRect/>
+                </a:stretch>
+              </p:blipFill>
+              <p:spPr>
+                <a:xfrm>
+                  <a:off x="6651633" y="2119394"/>
+                  <a:ext cx="121680" cy="270720"/>
+                </a:xfrm>
+                <a:prstGeom prst="rect">
+                  <a:avLst/>
+                </a:prstGeom>
+              </p:spPr>
+            </p:pic>
+          </mc:Fallback>
+        </mc:AlternateContent>
+        <mc:AlternateContent xmlns:mc="http://schemas.openxmlformats.org/markup-compatibility/2006">
+          <mc:Choice xmlns:p14="http://schemas.microsoft.com/office/powerpoint/2010/main" Requires="p14">
+            <p:contentPart p14:bwMode="auto" r:id="rId45">
+              <p14:nvContentPartPr>
+                <p14:cNvPr id="28" name="Ink 27">
+                  <a:extLst>
+                    <a:ext uri="{FF2B5EF4-FFF2-40B4-BE49-F238E27FC236}">
+                      <a16:creationId xmlns:a16="http://schemas.microsoft.com/office/drawing/2014/main" id="{2B7A6585-7EF9-4909-AEE0-92722423A82F}"/>
+                    </a:ext>
+                  </a:extLst>
+                </p14:cNvPr>
+                <p14:cNvContentPartPr/>
+                <p14:nvPr/>
+              </p14:nvContentPartPr>
+              <p14:xfrm>
+                <a:off x="6753873" y="2190674"/>
+                <a:ext cx="152280" cy="222120"/>
+              </p14:xfrm>
+            </p:contentPart>
+          </mc:Choice>
+          <mc:Fallback>
+            <p:pic>
+              <p:nvPicPr>
+                <p:cNvPr id="28" name="Ink 27">
+                  <a:extLst>
+                    <a:ext uri="{FF2B5EF4-FFF2-40B4-BE49-F238E27FC236}">
+                      <a16:creationId xmlns:a16="http://schemas.microsoft.com/office/drawing/2014/main" id="{2B7A6585-7EF9-4909-AEE0-92722423A82F}"/>
+                    </a:ext>
+                  </a:extLst>
+                </p:cNvPr>
+                <p:cNvPicPr/>
+                <p:nvPr/>
+              </p:nvPicPr>
+              <p:blipFill>
+                <a:blip r:embed="rId46"/>
+                <a:stretch>
+                  <a:fillRect/>
+                </a:stretch>
+              </p:blipFill>
+              <p:spPr>
+                <a:xfrm>
+                  <a:off x="6744873" y="2182034"/>
+                  <a:ext cx="169920" cy="239760"/>
+                </a:xfrm>
+                <a:prstGeom prst="rect">
+                  <a:avLst/>
+                </a:prstGeom>
+              </p:spPr>
+            </p:pic>
+          </mc:Fallback>
+        </mc:AlternateContent>
+        <mc:AlternateContent xmlns:mc="http://schemas.openxmlformats.org/markup-compatibility/2006">
+          <mc:Choice xmlns:p14="http://schemas.microsoft.com/office/powerpoint/2010/main" Requires="p14">
+            <p:contentPart p14:bwMode="auto" r:id="rId47">
+              <p14:nvContentPartPr>
+                <p14:cNvPr id="29" name="Ink 28">
+                  <a:extLst>
+                    <a:ext uri="{FF2B5EF4-FFF2-40B4-BE49-F238E27FC236}">
+                      <a16:creationId xmlns:a16="http://schemas.microsoft.com/office/drawing/2014/main" id="{28E3E893-E552-4834-BCEC-ACD873314851}"/>
+                    </a:ext>
+                  </a:extLst>
+                </p14:cNvPr>
+                <p14:cNvContentPartPr/>
+                <p14:nvPr/>
+              </p14:nvContentPartPr>
+              <p14:xfrm>
+                <a:off x="7023153" y="2317394"/>
+                <a:ext cx="1800" cy="360"/>
+              </p14:xfrm>
+            </p:contentPart>
+          </mc:Choice>
+          <mc:Fallback>
+            <p:pic>
+              <p:nvPicPr>
+                <p:cNvPr id="29" name="Ink 28">
+                  <a:extLst>
+                    <a:ext uri="{FF2B5EF4-FFF2-40B4-BE49-F238E27FC236}">
+                      <a16:creationId xmlns:a16="http://schemas.microsoft.com/office/drawing/2014/main" id="{28E3E893-E552-4834-BCEC-ACD873314851}"/>
+                    </a:ext>
+                  </a:extLst>
+                </p:cNvPr>
+                <p:cNvPicPr/>
+                <p:nvPr/>
+              </p:nvPicPr>
+              <p:blipFill>
+                <a:blip r:embed="rId36"/>
+                <a:stretch>
+                  <a:fillRect/>
+                </a:stretch>
+              </p:blipFill>
+              <p:spPr>
+                <a:xfrm>
+                  <a:off x="7014513" y="2308394"/>
+                  <a:ext cx="19440" cy="18000"/>
+                </a:xfrm>
+                <a:prstGeom prst="rect">
+                  <a:avLst/>
+                </a:prstGeom>
+              </p:spPr>
+            </p:pic>
+          </mc:Fallback>
+        </mc:AlternateContent>
+        <mc:AlternateContent xmlns:mc="http://schemas.openxmlformats.org/markup-compatibility/2006">
+          <mc:Choice xmlns:p14="http://schemas.microsoft.com/office/powerpoint/2010/main" Requires="p14">
+            <p:contentPart p14:bwMode="auto" r:id="rId48">
+              <p14:nvContentPartPr>
+                <p14:cNvPr id="32" name="Ink 31">
+                  <a:extLst>
+                    <a:ext uri="{FF2B5EF4-FFF2-40B4-BE49-F238E27FC236}">
+                      <a16:creationId xmlns:a16="http://schemas.microsoft.com/office/drawing/2014/main" id="{734133AC-1E64-45D6-94F3-58F83BE34859}"/>
+                    </a:ext>
+                  </a:extLst>
+                </p14:cNvPr>
+                <p14:cNvContentPartPr/>
+                <p14:nvPr/>
+              </p14:nvContentPartPr>
+              <p14:xfrm>
+                <a:off x="5872233" y="2490554"/>
+                <a:ext cx="360" cy="78120"/>
+              </p14:xfrm>
+            </p:contentPart>
+          </mc:Choice>
+          <mc:Fallback>
+            <p:pic>
+              <p:nvPicPr>
+                <p:cNvPr id="32" name="Ink 31">
+                  <a:extLst>
+                    <a:ext uri="{FF2B5EF4-FFF2-40B4-BE49-F238E27FC236}">
+                      <a16:creationId xmlns:a16="http://schemas.microsoft.com/office/drawing/2014/main" id="{734133AC-1E64-45D6-94F3-58F83BE34859}"/>
+                    </a:ext>
+                  </a:extLst>
+                </p:cNvPr>
+                <p:cNvPicPr/>
+                <p:nvPr/>
+              </p:nvPicPr>
+              <p:blipFill>
+                <a:blip r:embed="rId49"/>
+                <a:stretch>
+                  <a:fillRect/>
+                </a:stretch>
+              </p:blipFill>
+              <p:spPr>
+                <a:xfrm>
+                  <a:off x="5863593" y="2481914"/>
+                  <a:ext cx="18000" cy="95760"/>
+                </a:xfrm>
+                <a:prstGeom prst="rect">
+                  <a:avLst/>
+                </a:prstGeom>
+              </p:spPr>
+            </p:pic>
+          </mc:Fallback>
+        </mc:AlternateContent>
+        <mc:AlternateContent xmlns:mc="http://schemas.openxmlformats.org/markup-compatibility/2006">
+          <mc:Choice xmlns:p14="http://schemas.microsoft.com/office/powerpoint/2010/main" Requires="p14">
+            <p:contentPart p14:bwMode="auto" r:id="rId50">
+              <p14:nvContentPartPr>
+                <p14:cNvPr id="33" name="Ink 32">
+                  <a:extLst>
+                    <a:ext uri="{FF2B5EF4-FFF2-40B4-BE49-F238E27FC236}">
+                      <a16:creationId xmlns:a16="http://schemas.microsoft.com/office/drawing/2014/main" id="{F2364BF4-AA7E-4D7A-AE07-656D4F851005}"/>
+                    </a:ext>
+                  </a:extLst>
+                </p14:cNvPr>
+                <p14:cNvContentPartPr/>
+                <p14:nvPr/>
+              </p14:nvContentPartPr>
+              <p14:xfrm>
+                <a:off x="6034953" y="2292554"/>
+                <a:ext cx="129240" cy="167040"/>
+              </p14:xfrm>
+            </p:contentPart>
+          </mc:Choice>
+          <mc:Fallback>
+            <p:pic>
+              <p:nvPicPr>
+                <p:cNvPr id="33" name="Ink 32">
+                  <a:extLst>
+                    <a:ext uri="{FF2B5EF4-FFF2-40B4-BE49-F238E27FC236}">
+                      <a16:creationId xmlns:a16="http://schemas.microsoft.com/office/drawing/2014/main" id="{F2364BF4-AA7E-4D7A-AE07-656D4F851005}"/>
+                    </a:ext>
+                  </a:extLst>
+                </p:cNvPr>
+                <p:cNvPicPr/>
+                <p:nvPr/>
+              </p:nvPicPr>
+              <p:blipFill>
+                <a:blip r:embed="rId51"/>
+                <a:stretch>
+                  <a:fillRect/>
+                </a:stretch>
+              </p:blipFill>
+              <p:spPr>
+                <a:xfrm>
+                  <a:off x="6026313" y="2283554"/>
+                  <a:ext cx="146880" cy="184680"/>
+                </a:xfrm>
+                <a:prstGeom prst="rect">
+                  <a:avLst/>
+                </a:prstGeom>
+              </p:spPr>
+            </p:pic>
+          </mc:Fallback>
+        </mc:AlternateContent>
+      </p:grpSp>
     </p:spTree>
     <p:extLst>
       <p:ext uri="{BB962C8B-B14F-4D97-AF65-F5344CB8AC3E}">
@@ -9363,8 +11485,8 @@
 </file>
 
 <file path=customXml/item11.xml><?xml version="1.0" encoding="utf-8"?>
-<Control xmlns="http://schemas.microsoft.com/VisualStudio/2011/storyboarding/control/v1.0">
-  <Id Name="System.Storyboarding.Icons.Help" RevisionId="05cd6d03-c0b2-488e-98a7-d68de69a2cfc" Stencil="System.Storyboarding.Icons" StencilRevisionId="05cd6d03-c0b2-488e-98a7-d68de69a2cfc" StencilVersion="0.1"/>
+<Control xmlns="http://schemas.microsoft.com/VisualStudio/2011/storyboarding/control">
+  <Id Name="System.Storyboarding.WindowsPhone.Tile" Revision="1" Stencil="System.Storyboarding.WindowsPhone" StencilVersion="0.1"/>
 </Control>
 </file>
 
@@ -9382,31 +11504,31 @@
 
 <file path=customXml/item14.xml><?xml version="1.0" encoding="utf-8"?>
 <Control xmlns="http://schemas.microsoft.com/VisualStudio/2011/storyboarding/control/v1.0">
-  <Id Name="System.Storyboarding.Common.Breadcrumb" RevisionId="68ea164d-c1de-47a5-804f-d4d1290fa524" Stencil="System.Storyboarding.Common" StencilRevisionId="68ea164d-c1de-47a5-804f-d4d1290fa524" StencilVersion="0.1"/>
+  <Id Name="System.Storyboarding.Icons.FolderOpen" RevisionId="05cd6d03-c0b2-488e-98a7-d68de69a2cfc" Stencil="System.Storyboarding.Icons" StencilRevisionId="05cd6d03-c0b2-488e-98a7-d68de69a2cfc" StencilVersion="0.1"/>
 </Control>
 </file>
 
 <file path=customXml/item15.xml><?xml version="1.0" encoding="utf-8"?>
-<Control xmlns="http://schemas.microsoft.com/VisualStudio/2011/storyboarding/control/v1.0">
-  <Id Name="System.Storyboarding.Common.Text" RevisionId="68ea164d-c1de-47a5-804f-d4d1290fa524" Stencil="System.Storyboarding.Common" StencilRevisionId="68ea164d-c1de-47a5-804f-d4d1290fa524" StencilVersion="0.1"/>
+<Control xmlns="http://schemas.microsoft.com/VisualStudio/2011/storyboarding/control">
+  <Id Name="System.Storyboarding.Backgrounds.SharePoint" Revision="1" Stencil="System.Storyboarding.Backgrounds" StencilVersion="0.1"/>
 </Control>
 </file>
 
 <file path=customXml/item16.xml><?xml version="1.0" encoding="utf-8"?>
-<Control xmlns="http://schemas.microsoft.com/VisualStudio/2011/storyboarding/control/v1.0">
-  <Id Name="System.Storyboarding.Common.SearchBox" RevisionId="68ea164d-c1de-47a5-804f-d4d1290fa524" Stencil="System.Storyboarding.Common" StencilRevisionId="68ea164d-c1de-47a5-804f-d4d1290fa524" StencilVersion="0.1"/>
+<Control xmlns="http://schemas.microsoft.com/VisualStudio/2011/storyboarding/control">
+  <Id Name="System.Storyboarding.WindowsPhone.WideTile" Revision="1" Stencil="System.Storyboarding.WindowsPhone" StencilVersion="0.1"/>
 </Control>
 </file>
 
 <file path=customXml/item17.xml><?xml version="1.0" encoding="utf-8"?>
-<Control xmlns="http://schemas.microsoft.com/VisualStudio/2011/storyboarding/control/v1.0">
-  <Id Name="System.Storyboarding.Common.Text" RevisionId="68ea164d-c1de-47a5-804f-d4d1290fa524" Stencil="System.Storyboarding.Common" StencilRevisionId="68ea164d-c1de-47a5-804f-d4d1290fa524" StencilVersion="0.1"/>
+<Control xmlns="http://schemas.microsoft.com/VisualStudio/2011/storyboarding/control">
+  <Id Name="System.Storyboarding.Icons.User" Revision="1" Stencil="System.Storyboarding.Icons" StencilVersion="0.1"/>
 </Control>
 </file>
 
 <file path=customXml/item18.xml><?xml version="1.0" encoding="utf-8"?>
-<Control xmlns="http://schemas.microsoft.com/VisualStudio/2011/storyboarding/control">
-  <Id Name="System.Storyboarding.WindowsPhone.Tile" Revision="1" Stencil="System.Storyboarding.WindowsPhone" StencilVersion="0.1"/>
+<Control xmlns="http://schemas.microsoft.com/VisualStudio/2011/storyboarding/control/v1.0">
+  <Id Name="System.Storyboarding.Common.Text" RevisionId="68ea164d-c1de-47a5-804f-d4d1290fa524" Stencil="System.Storyboarding.Common" StencilRevisionId="68ea164d-c1de-47a5-804f-d4d1290fa524" StencilVersion="0.1"/>
 </Control>
 </file>
 
@@ -9417,20 +11539,20 @@
 </file>
 
 <file path=customXml/item2.xml><?xml version="1.0" encoding="utf-8"?>
-<Control xmlns="http://schemas.microsoft.com/VisualStudio/2011/storyboarding/control">
-  <Id Name="System.Storyboarding.WindowsPhone.Tile" Revision="1" Stencil="System.Storyboarding.WindowsPhone" StencilVersion="0.1"/>
+<Control xmlns="http://schemas.microsoft.com/VisualStudio/2011/storyboarding/control/v1.0">
+  <Id Name="System.Storyboarding.Common.Text" RevisionId="68ea164d-c1de-47a5-804f-d4d1290fa524" Stencil="System.Storyboarding.Common" StencilRevisionId="68ea164d-c1de-47a5-804f-d4d1290fa524" StencilVersion="0.1"/>
 </Control>
 </file>
 
 <file path=customXml/item20.xml><?xml version="1.0" encoding="utf-8"?>
-<Control xmlns="http://schemas.microsoft.com/VisualStudio/2011/storyboarding/control">
-  <Id Name="System.Storyboarding.Backgrounds.SharePoint" Revision="1" Stencil="System.Storyboarding.Backgrounds" StencilVersion="0.1"/>
+<Control xmlns="http://schemas.microsoft.com/VisualStudio/2011/storyboarding/control/v1.0">
+  <Id Name="System.Storyboarding.Common.Text" RevisionId="68ea164d-c1de-47a5-804f-d4d1290fa524" Stencil="System.Storyboarding.Common" StencilRevisionId="68ea164d-c1de-47a5-804f-d4d1290fa524" StencilVersion="0.1"/>
 </Control>
 </file>
 
 <file path=customXml/item21.xml><?xml version="1.0" encoding="utf-8"?>
-<Control xmlns="http://schemas.microsoft.com/VisualStudio/2011/storyboarding/control/v1.0">
-  <Id Name="System.Storyboarding.Common.Text" RevisionId="68ea164d-c1de-47a5-804f-d4d1290fa524" Stencil="System.Storyboarding.Common" StencilRevisionId="68ea164d-c1de-47a5-804f-d4d1290fa524" StencilVersion="0.1"/>
+<Control xmlns="http://schemas.microsoft.com/VisualStudio/2011/storyboarding/control">
+  <Id Name="System.Storyboarding.Backgrounds.StartScreen" Revision="1" Stencil="System.Storyboarding.Backgrounds" StencilVersion="0.1"/>
 </Control>
 </file>
 
@@ -9442,66 +11564,66 @@
 
 <file path=customXml/item23.xml><?xml version="1.0" encoding="utf-8"?>
 <Control xmlns="http://schemas.microsoft.com/VisualStudio/2011/storyboarding/control/v1.0">
-  <Id Name="System.Storyboarding.Common.DropdownBox" RevisionId="68ea164d-c1de-47a5-804f-d4d1290fa524" Stencil="System.Storyboarding.Common" StencilRevisionId="68ea164d-c1de-47a5-804f-d4d1290fa524" StencilVersion="0.1"/>
+  <Id Name="System.Storyboarding.Common.SearchBox" RevisionId="68ea164d-c1de-47a5-804f-d4d1290fa524" Stencil="System.Storyboarding.Common" StencilRevisionId="68ea164d-c1de-47a5-804f-d4d1290fa524" StencilVersion="0.1"/>
 </Control>
 </file>
 
 <file path=customXml/item24.xml><?xml version="1.0" encoding="utf-8"?>
 <Control xmlns="http://schemas.microsoft.com/VisualStudio/2011/storyboarding/control/v1.0">
-  <Id Name="System.Storyboarding.Common.Text" RevisionId="68ea164d-c1de-47a5-804f-d4d1290fa524" Stencil="System.Storyboarding.Common" StencilRevisionId="68ea164d-c1de-47a5-804f-d4d1290fa524" StencilVersion="0.1"/>
+  <Id Name="System.Storyboarding.Icons.Help" RevisionId="05cd6d03-c0b2-488e-98a7-d68de69a2cfc" Stencil="System.Storyboarding.Icons" StencilRevisionId="05cd6d03-c0b2-488e-98a7-d68de69a2cfc" StencilVersion="0.1"/>
 </Control>
 </file>
 
 <file path=customXml/item25.xml><?xml version="1.0" encoding="utf-8"?>
 <Control xmlns="http://schemas.microsoft.com/VisualStudio/2011/storyboarding/control/v1.0">
-  <Id Name="System.Storyboarding.Icons.FolderOpen" RevisionId="05cd6d03-c0b2-488e-98a7-d68de69a2cfc" Stencil="System.Storyboarding.Icons" StencilRevisionId="05cd6d03-c0b2-488e-98a7-d68de69a2cfc" StencilVersion="0.1"/>
+  <Id Name="System.Storyboarding.Common.Text" RevisionId="68ea164d-c1de-47a5-804f-d4d1290fa524" Stencil="System.Storyboarding.Common" StencilRevisionId="68ea164d-c1de-47a5-804f-d4d1290fa524" StencilVersion="0.1"/>
 </Control>
 </file>
 
 <file path=customXml/item3.xml><?xml version="1.0" encoding="utf-8"?>
+<Control xmlns="http://schemas.microsoft.com/VisualStudio/2011/storyboarding/control/v1.0">
+  <Id Name="System.Storyboarding.Common.DropdownBox" RevisionId="68ea164d-c1de-47a5-804f-d4d1290fa524" Stencil="System.Storyboarding.Common" StencilRevisionId="68ea164d-c1de-47a5-804f-d4d1290fa524" StencilVersion="0.1"/>
+</Control>
+</file>
+
+<file path=customXml/item4.xml><?xml version="1.0" encoding="utf-8"?>
 <Control xmlns="http://schemas.microsoft.com/VisualStudio/2011/storyboarding/control">
   <Id Name="System.Storyboarding.WindowsPhone.Tile" Revision="1" Stencil="System.Storyboarding.WindowsPhone" StencilVersion="0.1"/>
 </Control>
 </file>
 
-<file path=customXml/item4.xml><?xml version="1.0" encoding="utf-8"?>
+<file path=customXml/item5.xml><?xml version="1.0" encoding="utf-8"?>
+<Control xmlns="http://schemas.microsoft.com/VisualStudio/2011/storyboarding/control">
+  <Id Name="System.Storyboarding.WindowsPhone.Tile" Revision="1" Stencil="System.Storyboarding.WindowsPhone" StencilVersion="0.1"/>
+</Control>
+</file>
+
+<file path=customXml/item6.xml><?xml version="1.0" encoding="utf-8"?>
 <Control xmlns="http://schemas.microsoft.com/VisualStudio/2011/storyboarding/control">
   <Id Name="System.Storyboarding.WindowsPhone.WideTile" Revision="1" Stencil="System.Storyboarding.WindowsPhone" StencilVersion="0.1"/>
 </Control>
 </file>
 
-<file path=customXml/item5.xml><?xml version="1.0" encoding="utf-8"?>
-<Control xmlns="http://schemas.microsoft.com/VisualStudio/2011/storyboarding/control">
-  <Id Name="System.Storyboarding.WindowsPhone.WideTile" Revision="1" Stencil="System.Storyboarding.WindowsPhone" StencilVersion="0.1"/>
-</Control>
-</file>
-
-<file path=customXml/item6.xml><?xml version="1.0" encoding="utf-8"?>
-<Control xmlns="http://schemas.microsoft.com/VisualStudio/2011/storyboarding/control">
-  <Id Name="System.Storyboarding.Icons.User" Revision="1" Stencil="System.Storyboarding.Icons" StencilVersion="0.1"/>
-</Control>
-</file>
-
 <file path=customXml/item7.xml><?xml version="1.0" encoding="utf-8"?>
-<Control xmlns="http://schemas.microsoft.com/VisualStudio/2011/storyboarding/control">
-  <Id Name="System.Storyboarding.Backgrounds.StartScreen" Revision="1" Stencil="System.Storyboarding.Backgrounds" StencilVersion="0.1"/>
+<Control xmlns="http://schemas.microsoft.com/VisualStudio/2011/storyboarding/control/v1.0">
+  <Id Name="System.Storyboarding.Common.Text" RevisionId="68ea164d-c1de-47a5-804f-d4d1290fa524" Stencil="System.Storyboarding.Common" StencilRevisionId="68ea164d-c1de-47a5-804f-d4d1290fa524" StencilVersion="0.1"/>
 </Control>
 </file>
 
 <file path=customXml/item8.xml><?xml version="1.0" encoding="utf-8"?>
+<Control xmlns="http://schemas.microsoft.com/VisualStudio/2011/storyboarding/control/v1.0">
+  <Id Name="System.Storyboarding.Common.Breadcrumb" RevisionId="68ea164d-c1de-47a5-804f-d4d1290fa524" Stencil="System.Storyboarding.Common" StencilRevisionId="68ea164d-c1de-47a5-804f-d4d1290fa524" StencilVersion="0.1"/>
+</Control>
+</file>
+
+<file path=customXml/item9.xml><?xml version="1.0" encoding="utf-8"?>
 <Control xmlns="http://schemas.microsoft.com/VisualStudio/2011/storyboarding/control">
   <Id Name="System.Storyboarding.WindowsPhone.Tile" Revision="1" Stencil="System.Storyboarding.WindowsPhone" StencilVersion="0.1"/>
 </Control>
 </file>
 
-<file path=customXml/item9.xml><?xml version="1.0" encoding="utf-8"?>
-<Control xmlns="http://schemas.microsoft.com/VisualStudio/2011/storyboarding/control/v1.0">
-  <Id Name="System.Storyboarding.Common.Text" RevisionId="68ea164d-c1de-47a5-804f-d4d1290fa524" Stencil="System.Storyboarding.Common" StencilRevisionId="68ea164d-c1de-47a5-804f-d4d1290fa524" StencilVersion="0.1"/>
-</Control>
-</file>
-
 <file path=customXml/itemProps1.xml><?xml version="1.0" encoding="utf-8"?>
-<ds:datastoreItem xmlns:ds="http://schemas.openxmlformats.org/officeDocument/2006/customXml" ds:itemID="{A20CCF91-9787-422A-AEBB-C4729D818C00}">
+<ds:datastoreItem xmlns:ds="http://schemas.openxmlformats.org/officeDocument/2006/customXml" ds:itemID="{5F8B743C-58C9-496B-861D-37CFDCB689D2}">
   <ds:schemaRefs>
     <ds:schemaRef ds:uri="http://schemas.microsoft.com/VisualStudio/2011/storyboarding/control"/>
   </ds:schemaRefs>
@@ -9509,7 +11631,7 @@
 </file>
 
 <file path=customXml/itemProps10.xml><?xml version="1.0" encoding="utf-8"?>
-<ds:datastoreItem xmlns:ds="http://schemas.openxmlformats.org/officeDocument/2006/customXml" ds:itemID="{864CECF6-9DCA-4D1C-9B38-E0688ABC9BEF}">
+<ds:datastoreItem xmlns:ds="http://schemas.openxmlformats.org/officeDocument/2006/customXml" ds:itemID="{0A0B0AB4-528F-45D0-9477-351EBE4AC7B5}">
   <ds:schemaRefs>
     <ds:schemaRef ds:uri="http://schemas.microsoft.com/VisualStudio/2011/storyboarding/control"/>
   </ds:schemaRefs>
@@ -9517,9 +11639,9 @@
 </file>
 
 <file path=customXml/itemProps11.xml><?xml version="1.0" encoding="utf-8"?>
-<ds:datastoreItem xmlns:ds="http://schemas.openxmlformats.org/officeDocument/2006/customXml" ds:itemID="{E8B65369-76D4-44B9-8CEB-D454AC76CCEB}">
+<ds:datastoreItem xmlns:ds="http://schemas.openxmlformats.org/officeDocument/2006/customXml" ds:itemID="{A56E7BBF-4AD1-4BAB-BB90-656BC303E394}">
   <ds:schemaRefs>
-    <ds:schemaRef ds:uri="http://schemas.microsoft.com/VisualStudio/2011/storyboarding/control/v1.0"/>
+    <ds:schemaRef ds:uri="http://schemas.microsoft.com/VisualStudio/2011/storyboarding/control"/>
   </ds:schemaRefs>
 </ds:datastoreItem>
 </file>
@@ -9533,6 +11655,46 @@
 </file>
 
 <file path=customXml/itemProps13.xml><?xml version="1.0" encoding="utf-8"?>
+<ds:datastoreItem xmlns:ds="http://schemas.openxmlformats.org/officeDocument/2006/customXml" ds:itemID="{BCFDDF06-4D2E-4D6D-9A1B-C447B3F4EA67}">
+  <ds:schemaRefs>
+    <ds:schemaRef ds:uri="http://schemas.microsoft.com/VisualStudio/2011/storyboarding/control/v1.0"/>
+  </ds:schemaRefs>
+</ds:datastoreItem>
+</file>
+
+<file path=customXml/itemProps14.xml><?xml version="1.0" encoding="utf-8"?>
+<ds:datastoreItem xmlns:ds="http://schemas.openxmlformats.org/officeDocument/2006/customXml" ds:itemID="{6CA1E503-3BE5-48F9-8903-1F5A0E5B53FA}">
+  <ds:schemaRefs>
+    <ds:schemaRef ds:uri="http://schemas.microsoft.com/VisualStudio/2011/storyboarding/control/v1.0"/>
+  </ds:schemaRefs>
+</ds:datastoreItem>
+</file>
+
+<file path=customXml/itemProps15.xml><?xml version="1.0" encoding="utf-8"?>
+<ds:datastoreItem xmlns:ds="http://schemas.openxmlformats.org/officeDocument/2006/customXml" ds:itemID="{32A0AC90-5A7B-4F20-B939-510F52AD2B51}">
+  <ds:schemaRefs>
+    <ds:schemaRef ds:uri="http://schemas.microsoft.com/VisualStudio/2011/storyboarding/control"/>
+  </ds:schemaRefs>
+</ds:datastoreItem>
+</file>
+
+<file path=customXml/itemProps16.xml><?xml version="1.0" encoding="utf-8"?>
+<ds:datastoreItem xmlns:ds="http://schemas.openxmlformats.org/officeDocument/2006/customXml" ds:itemID="{A20CCF91-9787-422A-AEBB-C4729D818C00}">
+  <ds:schemaRefs>
+    <ds:schemaRef ds:uri="http://schemas.microsoft.com/VisualStudio/2011/storyboarding/control"/>
+  </ds:schemaRefs>
+</ds:datastoreItem>
+</file>
+
+<file path=customXml/itemProps17.xml><?xml version="1.0" encoding="utf-8"?>
+<ds:datastoreItem xmlns:ds="http://schemas.openxmlformats.org/officeDocument/2006/customXml" ds:itemID="{2D71B260-49DD-430A-993F-35BB818160D2}">
+  <ds:schemaRefs>
+    <ds:schemaRef ds:uri="http://schemas.microsoft.com/VisualStudio/2011/storyboarding/control"/>
+  </ds:schemaRefs>
+</ds:datastoreItem>
+</file>
+
+<file path=customXml/itemProps18.xml><?xml version="1.0" encoding="utf-8"?>
 <ds:datastoreItem xmlns:ds="http://schemas.openxmlformats.org/officeDocument/2006/customXml" ds:itemID="{D876FCC0-9E7A-48B1-8E50-1A0759F74E0A}">
   <ds:schemaRefs>
     <ds:schemaRef ds:uri="http://schemas.microsoft.com/VisualStudio/2011/storyboarding/control/v1.0"/>
@@ -9540,7 +11702,111 @@
 </ds:datastoreItem>
 </file>
 
-<file path=customXml/itemProps14.xml><?xml version="1.0" encoding="utf-8"?>
+<file path=customXml/itemProps19.xml><?xml version="1.0" encoding="utf-8"?>
+<ds:datastoreItem xmlns:ds="http://schemas.openxmlformats.org/officeDocument/2006/customXml" ds:itemID="{B86ED811-76FA-470E-BF65-7B08F4E478BD}">
+  <ds:schemaRefs>
+    <ds:schemaRef ds:uri="http://schemas.microsoft.com/VisualStudio/2011/storyboarding/control"/>
+  </ds:schemaRefs>
+</ds:datastoreItem>
+</file>
+
+<file path=customXml/itemProps2.xml><?xml version="1.0" encoding="utf-8"?>
+<ds:datastoreItem xmlns:ds="http://schemas.openxmlformats.org/officeDocument/2006/customXml" ds:itemID="{4475BC4D-1BB3-42EE-94C9-1B162D8BAFED}">
+  <ds:schemaRefs>
+    <ds:schemaRef ds:uri="http://schemas.microsoft.com/VisualStudio/2011/storyboarding/control/v1.0"/>
+  </ds:schemaRefs>
+</ds:datastoreItem>
+</file>
+
+<file path=customXml/itemProps20.xml><?xml version="1.0" encoding="utf-8"?>
+<ds:datastoreItem xmlns:ds="http://schemas.openxmlformats.org/officeDocument/2006/customXml" ds:itemID="{6089AD14-2AFF-487A-A99A-106B05215CC5}">
+  <ds:schemaRefs>
+    <ds:schemaRef ds:uri="http://schemas.microsoft.com/VisualStudio/2011/storyboarding/control/v1.0"/>
+  </ds:schemaRefs>
+</ds:datastoreItem>
+</file>
+
+<file path=customXml/itemProps21.xml><?xml version="1.0" encoding="utf-8"?>
+<ds:datastoreItem xmlns:ds="http://schemas.openxmlformats.org/officeDocument/2006/customXml" ds:itemID="{EFF7AEFB-3FB3-4FD6-ACC5-6127F97B1D33}">
+  <ds:schemaRefs>
+    <ds:schemaRef ds:uri="http://schemas.microsoft.com/VisualStudio/2011/storyboarding/control"/>
+  </ds:schemaRefs>
+</ds:datastoreItem>
+</file>
+
+<file path=customXml/itemProps22.xml><?xml version="1.0" encoding="utf-8"?>
+<ds:datastoreItem xmlns:ds="http://schemas.openxmlformats.org/officeDocument/2006/customXml" ds:itemID="{1C0C511F-E67D-4D4A-9A7B-6E9F2916E4D8}">
+  <ds:schemaRefs>
+    <ds:schemaRef ds:uri="http://schemas.microsoft.com/VisualStudio/2011/storyboarding/control"/>
+  </ds:schemaRefs>
+</ds:datastoreItem>
+</file>
+
+<file path=customXml/itemProps23.xml><?xml version="1.0" encoding="utf-8"?>
+<ds:datastoreItem xmlns:ds="http://schemas.openxmlformats.org/officeDocument/2006/customXml" ds:itemID="{AB8AF5A6-FA45-4246-A67D-74215671FBEF}">
+  <ds:schemaRefs>
+    <ds:schemaRef ds:uri="http://schemas.microsoft.com/VisualStudio/2011/storyboarding/control/v1.0"/>
+  </ds:schemaRefs>
+</ds:datastoreItem>
+</file>
+
+<file path=customXml/itemProps24.xml><?xml version="1.0" encoding="utf-8"?>
+<ds:datastoreItem xmlns:ds="http://schemas.openxmlformats.org/officeDocument/2006/customXml" ds:itemID="{E8B65369-76D4-44B9-8CEB-D454AC76CCEB}">
+  <ds:schemaRefs>
+    <ds:schemaRef ds:uri="http://schemas.microsoft.com/VisualStudio/2011/storyboarding/control/v1.0"/>
+  </ds:schemaRefs>
+</ds:datastoreItem>
+</file>
+
+<file path=customXml/itemProps25.xml><?xml version="1.0" encoding="utf-8"?>
+<ds:datastoreItem xmlns:ds="http://schemas.openxmlformats.org/officeDocument/2006/customXml" ds:itemID="{05C8BB45-782C-4141-A21F-408D72D18D5D}">
+  <ds:schemaRefs>
+    <ds:schemaRef ds:uri="http://schemas.microsoft.com/VisualStudio/2011/storyboarding/control/v1.0"/>
+  </ds:schemaRefs>
+</ds:datastoreItem>
+</file>
+
+<file path=customXml/itemProps3.xml><?xml version="1.0" encoding="utf-8"?>
+<ds:datastoreItem xmlns:ds="http://schemas.openxmlformats.org/officeDocument/2006/customXml" ds:itemID="{5A6F5145-09F5-421E-ABA8-035D9DF59D73}">
+  <ds:schemaRefs>
+    <ds:schemaRef ds:uri="http://schemas.microsoft.com/VisualStudio/2011/storyboarding/control/v1.0"/>
+  </ds:schemaRefs>
+</ds:datastoreItem>
+</file>
+
+<file path=customXml/itemProps4.xml><?xml version="1.0" encoding="utf-8"?>
+<ds:datastoreItem xmlns:ds="http://schemas.openxmlformats.org/officeDocument/2006/customXml" ds:itemID="{864CECF6-9DCA-4D1C-9B38-E0688ABC9BEF}">
+  <ds:schemaRefs>
+    <ds:schemaRef ds:uri="http://schemas.microsoft.com/VisualStudio/2011/storyboarding/control"/>
+  </ds:schemaRefs>
+</ds:datastoreItem>
+</file>
+
+<file path=customXml/itemProps5.xml><?xml version="1.0" encoding="utf-8"?>
+<ds:datastoreItem xmlns:ds="http://schemas.openxmlformats.org/officeDocument/2006/customXml" ds:itemID="{8376A45C-3B73-430A-AB07-14AE228ECB55}">
+  <ds:schemaRefs>
+    <ds:schemaRef ds:uri="http://schemas.microsoft.com/VisualStudio/2011/storyboarding/control"/>
+  </ds:schemaRefs>
+</ds:datastoreItem>
+</file>
+
+<file path=customXml/itemProps6.xml><?xml version="1.0" encoding="utf-8"?>
+<ds:datastoreItem xmlns:ds="http://schemas.openxmlformats.org/officeDocument/2006/customXml" ds:itemID="{76EF0D77-C994-4232-9406-B3D450F81857}">
+  <ds:schemaRefs>
+    <ds:schemaRef ds:uri="http://schemas.microsoft.com/VisualStudio/2011/storyboarding/control"/>
+  </ds:schemaRefs>
+</ds:datastoreItem>
+</file>
+
+<file path=customXml/itemProps7.xml><?xml version="1.0" encoding="utf-8"?>
+<ds:datastoreItem xmlns:ds="http://schemas.openxmlformats.org/officeDocument/2006/customXml" ds:itemID="{E83CE332-ECC5-4BAC-A734-C260BE747A0D}">
+  <ds:schemaRefs>
+    <ds:schemaRef ds:uri="http://schemas.microsoft.com/VisualStudio/2011/storyboarding/control/v1.0"/>
+  </ds:schemaRefs>
+</ds:datastoreItem>
+</file>
+
+<file path=customXml/itemProps8.xml><?xml version="1.0" encoding="utf-8"?>
 <ds:datastoreItem xmlns:ds="http://schemas.openxmlformats.org/officeDocument/2006/customXml" ds:itemID="{2ED57B16-65F0-4D88-8FC8-86653DF414F3}">
   <ds:schemaRefs>
     <ds:schemaRef ds:uri="http://schemas.microsoft.com/VisualStudio/2011/storyboarding/control/v1.0"/>
@@ -9548,154 +11814,10 @@
 </ds:datastoreItem>
 </file>
 
-<file path=customXml/itemProps15.xml><?xml version="1.0" encoding="utf-8"?>
-<ds:datastoreItem xmlns:ds="http://schemas.openxmlformats.org/officeDocument/2006/customXml" ds:itemID="{4475BC4D-1BB3-42EE-94C9-1B162D8BAFED}">
-  <ds:schemaRefs>
-    <ds:schemaRef ds:uri="http://schemas.microsoft.com/VisualStudio/2011/storyboarding/control/v1.0"/>
-  </ds:schemaRefs>
-</ds:datastoreItem>
-</file>
-
-<file path=customXml/itemProps16.xml><?xml version="1.0" encoding="utf-8"?>
-<ds:datastoreItem xmlns:ds="http://schemas.openxmlformats.org/officeDocument/2006/customXml" ds:itemID="{AB8AF5A6-FA45-4246-A67D-74215671FBEF}">
-  <ds:schemaRefs>
-    <ds:schemaRef ds:uri="http://schemas.microsoft.com/VisualStudio/2011/storyboarding/control/v1.0"/>
-  </ds:schemaRefs>
-</ds:datastoreItem>
-</file>
-
-<file path=customXml/itemProps17.xml><?xml version="1.0" encoding="utf-8"?>
-<ds:datastoreItem xmlns:ds="http://schemas.openxmlformats.org/officeDocument/2006/customXml" ds:itemID="{BCFDDF06-4D2E-4D6D-9A1B-C447B3F4EA67}">
-  <ds:schemaRefs>
-    <ds:schemaRef ds:uri="http://schemas.microsoft.com/VisualStudio/2011/storyboarding/control/v1.0"/>
-  </ds:schemaRefs>
-</ds:datastoreItem>
-</file>
-
-<file path=customXml/itemProps18.xml><?xml version="1.0" encoding="utf-8"?>
-<ds:datastoreItem xmlns:ds="http://schemas.openxmlformats.org/officeDocument/2006/customXml" ds:itemID="{B86ED811-76FA-470E-BF65-7B08F4E478BD}">
-  <ds:schemaRefs>
-    <ds:schemaRef ds:uri="http://schemas.microsoft.com/VisualStudio/2011/storyboarding/control"/>
-  </ds:schemaRefs>
-</ds:datastoreItem>
-</file>
-
-<file path=customXml/itemProps19.xml><?xml version="1.0" encoding="utf-8"?>
-<ds:datastoreItem xmlns:ds="http://schemas.openxmlformats.org/officeDocument/2006/customXml" ds:itemID="{8376A45C-3B73-430A-AB07-14AE228ECB55}">
-  <ds:schemaRefs>
-    <ds:schemaRef ds:uri="http://schemas.microsoft.com/VisualStudio/2011/storyboarding/control"/>
-  </ds:schemaRefs>
-</ds:datastoreItem>
-</file>
-
-<file path=customXml/itemProps2.xml><?xml version="1.0" encoding="utf-8"?>
-<ds:datastoreItem xmlns:ds="http://schemas.openxmlformats.org/officeDocument/2006/customXml" ds:itemID="{1C0C511F-E67D-4D4A-9A7B-6E9F2916E4D8}">
-  <ds:schemaRefs>
-    <ds:schemaRef ds:uri="http://schemas.microsoft.com/VisualStudio/2011/storyboarding/control"/>
-  </ds:schemaRefs>
-</ds:datastoreItem>
-</file>
-
-<file path=customXml/itemProps20.xml><?xml version="1.0" encoding="utf-8"?>
-<ds:datastoreItem xmlns:ds="http://schemas.openxmlformats.org/officeDocument/2006/customXml" ds:itemID="{32A0AC90-5A7B-4F20-B939-510F52AD2B51}">
-  <ds:schemaRefs>
-    <ds:schemaRef ds:uri="http://schemas.microsoft.com/VisualStudio/2011/storyboarding/control"/>
-  </ds:schemaRefs>
-</ds:datastoreItem>
-</file>
-
-<file path=customXml/itemProps21.xml><?xml version="1.0" encoding="utf-8"?>
-<ds:datastoreItem xmlns:ds="http://schemas.openxmlformats.org/officeDocument/2006/customXml" ds:itemID="{6089AD14-2AFF-487A-A99A-106B05215CC5}">
-  <ds:schemaRefs>
-    <ds:schemaRef ds:uri="http://schemas.microsoft.com/VisualStudio/2011/storyboarding/control/v1.0"/>
-  </ds:schemaRefs>
-</ds:datastoreItem>
-</file>
-
-<file path=customXml/itemProps22.xml><?xml version="1.0" encoding="utf-8"?>
+<file path=customXml/itemProps9.xml><?xml version="1.0" encoding="utf-8"?>
 <ds:datastoreItem xmlns:ds="http://schemas.openxmlformats.org/officeDocument/2006/customXml" ds:itemID="{B945FD6A-04E9-4DD2-94EC-104268517FC4}">
   <ds:schemaRefs>
     <ds:schemaRef ds:uri="http://schemas.microsoft.com/VisualStudio/2011/storyboarding/control"/>
   </ds:schemaRefs>
 </ds:datastoreItem>
-</file>
-
-<file path=customXml/itemProps23.xml><?xml version="1.0" encoding="utf-8"?>
-<ds:datastoreItem xmlns:ds="http://schemas.openxmlformats.org/officeDocument/2006/customXml" ds:itemID="{5A6F5145-09F5-421E-ABA8-035D9DF59D73}">
-  <ds:schemaRefs>
-    <ds:schemaRef ds:uri="http://schemas.microsoft.com/VisualStudio/2011/storyboarding/control/v1.0"/>
-  </ds:schemaRefs>
-</ds:datastoreItem>
-</file>
-
-<file path=customXml/itemProps24.xml><?xml version="1.0" encoding="utf-8"?>
-<ds:datastoreItem xmlns:ds="http://schemas.openxmlformats.org/officeDocument/2006/customXml" ds:itemID="{05C8BB45-782C-4141-A21F-408D72D18D5D}">
-  <ds:schemaRefs>
-    <ds:schemaRef ds:uri="http://schemas.microsoft.com/VisualStudio/2011/storyboarding/control/v1.0"/>
-  </ds:schemaRefs>
-</ds:datastoreItem>
-</file>
-
-<file path=customXml/itemProps25.xml><?xml version="1.0" encoding="utf-8"?>
-<ds:datastoreItem xmlns:ds="http://schemas.openxmlformats.org/officeDocument/2006/customXml" ds:itemID="{6CA1E503-3BE5-48F9-8903-1F5A0E5B53FA}">
-  <ds:schemaRefs>
-    <ds:schemaRef ds:uri="http://schemas.microsoft.com/VisualStudio/2011/storyboarding/control/v1.0"/>
-  </ds:schemaRefs>
-</ds:datastoreItem>
-</file>
-
-<file path=customXml/itemProps3.xml><?xml version="1.0" encoding="utf-8"?>
-<ds:datastoreItem xmlns:ds="http://schemas.openxmlformats.org/officeDocument/2006/customXml" ds:itemID="{A56E7BBF-4AD1-4BAB-BB90-656BC303E394}">
-  <ds:schemaRefs>
-    <ds:schemaRef ds:uri="http://schemas.microsoft.com/VisualStudio/2011/storyboarding/control"/>
-  </ds:schemaRefs>
-</ds:datastoreItem>
-</file>
-
-<file path=customXml/itemProps4.xml><?xml version="1.0" encoding="utf-8"?>
-<ds:datastoreItem xmlns:ds="http://schemas.openxmlformats.org/officeDocument/2006/customXml" ds:itemID="{76EF0D77-C994-4232-9406-B3D450F81857}">
-  <ds:schemaRefs>
-    <ds:schemaRef ds:uri="http://schemas.microsoft.com/VisualStudio/2011/storyboarding/control"/>
-  </ds:schemaRefs>
-</ds:datastoreItem>
-</file>
-
-<file path=customXml/itemProps5.xml><?xml version="1.0" encoding="utf-8"?>
-<ds:datastoreItem xmlns:ds="http://schemas.openxmlformats.org/officeDocument/2006/customXml" ds:itemID="{5F8B743C-58C9-496B-861D-37CFDCB689D2}">
-  <ds:schemaRefs>
-    <ds:schemaRef ds:uri="http://schemas.microsoft.com/VisualStudio/2011/storyboarding/control"/>
-  </ds:schemaRefs>
-</ds:datastoreItem>
-</file>
-
-<file path=customXml/itemProps6.xml><?xml version="1.0" encoding="utf-8"?>
-<ds:datastoreItem xmlns:ds="http://schemas.openxmlformats.org/officeDocument/2006/customXml" ds:itemID="{2D71B260-49DD-430A-993F-35BB818160D2}">
-  <ds:schemaRefs>
-    <ds:schemaRef ds:uri="http://schemas.microsoft.com/VisualStudio/2011/storyboarding/control"/>
-  </ds:schemaRefs>
-</ds:datastoreItem>
-</file>
-
-<file path=customXml/itemProps7.xml><?xml version="1.0" encoding="utf-8"?>
-<ds:datastoreItem xmlns:ds="http://schemas.openxmlformats.org/officeDocument/2006/customXml" ds:itemID="{EFF7AEFB-3FB3-4FD6-ACC5-6127F97B1D33}">
-  <ds:schemaRefs>
-    <ds:schemaRef ds:uri="http://schemas.microsoft.com/VisualStudio/2011/storyboarding/control"/>
-  </ds:schemaRefs>
-</ds:datastoreItem>
-</file>
-
-<file path=customXml/itemProps8.xml><?xml version="1.0" encoding="utf-8"?>
-<ds:datastoreItem xmlns:ds="http://schemas.openxmlformats.org/officeDocument/2006/customXml" ds:itemID="{0A0B0AB4-528F-45D0-9477-351EBE4AC7B5}">
-  <ds:schemaRefs>
-    <ds:schemaRef ds:uri="http://schemas.microsoft.com/VisualStudio/2011/storyboarding/control"/>
-  </ds:schemaRefs>
-</ds:datastoreItem>
-</file>
-
-<file path=customXml/itemProps9.xml><?xml version="1.0" encoding="utf-8"?>
-<ds:datastoreItem xmlns:ds="http://schemas.openxmlformats.org/officeDocument/2006/customXml" ds:itemID="{E83CE332-ECC5-4BAC-A734-C260BE747A0D}">
-  <ds:schemaRefs>
-    <ds:schemaRef ds:uri="http://schemas.microsoft.com/VisualStudio/2011/storyboarding/control/v1.0"/>
-  </ds:schemaRefs>
-</ds:datastoreItem>
 </file>
</xml_diff>